<commit_message>
Finished presentation for tomorrow. Model Guide information is practically all presentable. MIS information for abstract objects is more or less ready to present. Several questions need to be answered in regards to how I'm doing.
</commit_message>
<xml_diff>
--- a/Design/mg-mis-presentation-1.pptx
+++ b/Design/mg-mis-presentation-1.pptx
@@ -5,25 +5,28 @@
     <p:sldMasterId id="2147483648" r:id="rId4"/>
   </p:sldMasterIdLst>
   <p:notesMasterIdLst>
-    <p:notesMasterId r:id="rId18"/>
+    <p:notesMasterId r:id="rId21"/>
   </p:notesMasterIdLst>
   <p:handoutMasterIdLst>
-    <p:handoutMasterId r:id="rId19"/>
+    <p:handoutMasterId r:id="rId22"/>
   </p:handoutMasterIdLst>
   <p:sldIdLst>
     <p:sldId id="531" r:id="rId5"/>
     <p:sldId id="532" r:id="rId6"/>
-    <p:sldId id="538" r:id="rId7"/>
-    <p:sldId id="540" r:id="rId8"/>
-    <p:sldId id="539" r:id="rId9"/>
-    <p:sldId id="541" r:id="rId10"/>
-    <p:sldId id="542" r:id="rId11"/>
-    <p:sldId id="543" r:id="rId12"/>
-    <p:sldId id="544" r:id="rId13"/>
-    <p:sldId id="545" r:id="rId14"/>
-    <p:sldId id="546" r:id="rId15"/>
-    <p:sldId id="547" r:id="rId16"/>
-    <p:sldId id="548" r:id="rId17"/>
+    <p:sldId id="551" r:id="rId7"/>
+    <p:sldId id="538" r:id="rId8"/>
+    <p:sldId id="540" r:id="rId9"/>
+    <p:sldId id="539" r:id="rId10"/>
+    <p:sldId id="541" r:id="rId11"/>
+    <p:sldId id="550" r:id="rId12"/>
+    <p:sldId id="543" r:id="rId13"/>
+    <p:sldId id="552" r:id="rId14"/>
+    <p:sldId id="544" r:id="rId15"/>
+    <p:sldId id="553" r:id="rId16"/>
+    <p:sldId id="542" r:id="rId17"/>
+    <p:sldId id="546" r:id="rId18"/>
+    <p:sldId id="548" r:id="rId19"/>
+    <p:sldId id="549" r:id="rId20"/>
   </p:sldIdLst>
   <p:sldSz cx="12192000" cy="6858000"/>
   <p:notesSz cx="6858000" cy="9144000"/>
@@ -123,6 +126,42 @@
     </a:lvl9pPr>
   </p:defaultTextStyle>
   <p:extLst>
+    <p:ext uri="{521415D9-36F7-43E2-AB2F-B90AF26B5E84}">
+      <p14:sectionLst xmlns:p14="http://schemas.microsoft.com/office/powerpoint/2010/main">
+        <p14:section name="Default Section" id="{DFCE91C0-F14D-4882-B5C5-0F2EB7733E82}">
+          <p14:sldIdLst>
+            <p14:sldId id="531"/>
+            <p14:sldId id="532"/>
+            <p14:sldId id="551"/>
+            <p14:sldId id="538"/>
+            <p14:sldId id="540"/>
+            <p14:sldId id="539"/>
+            <p14:sldId id="541"/>
+          </p14:sldIdLst>
+        </p14:section>
+        <p14:section name="Uses Hierarchy" id="{031951F9-D9D6-4C15-A756-77D11BEB1ED8}">
+          <p14:sldIdLst>
+            <p14:sldId id="550"/>
+          </p14:sldIdLst>
+        </p14:section>
+        <p14:section name="Behaviour Hiding Modules" id="{141D766A-0DF0-48A8-9CA6-6D22999F5B07}">
+          <p14:sldIdLst>
+            <p14:sldId id="543"/>
+            <p14:sldId id="552"/>
+            <p14:sldId id="544"/>
+            <p14:sldId id="553"/>
+            <p14:sldId id="542"/>
+            <p14:sldId id="546"/>
+          </p14:sldIdLst>
+        </p14:section>
+        <p14:section name="Software Decision Modules" id="{FEF08E6E-45F2-4C5B-8ABA-0D848BED7897}">
+          <p14:sldIdLst>
+            <p14:sldId id="548"/>
+            <p14:sldId id="549"/>
+          </p14:sldIdLst>
+        </p14:section>
+      </p14:sectionLst>
+    </p:ext>
     <p:ext uri="{EFAFB233-063F-42B5-8137-9DF3F51BA10A}">
       <p15:sldGuideLst xmlns:p15="http://schemas.microsoft.com/office/powerpoint/2012/main">
         <p15:guide id="1" orient="horz" pos="2136" userDrawn="1">
@@ -244,7 +283,7 @@
           <a:p>
             <a:fld id="{DA0B549D-7912-47CE-BB9D-C81C46F21077}" type="datetimeFigureOut">
               <a:rPr lang="en-US" smtClean="0"/>
-              <a:t>11/5/2019</a:t>
+              <a:t>11/6/2019</a:t>
             </a:fld>
             <a:endParaRPr lang="en-US" dirty="0"/>
           </a:p>
@@ -421,7 +460,7 @@
           <a:p>
             <a:fld id="{93D370A3-6847-4770-BAE0-862438C62089}" type="datetimeFigureOut">
               <a:rPr lang="en-US" smtClean="0"/>
-              <a:t>11/5/2019</a:t>
+              <a:t>11/6/2019</a:t>
             </a:fld>
             <a:endParaRPr lang="en-US" dirty="0"/>
           </a:p>
@@ -775,6 +814,267 @@
 </p:notes>
 </file>
 
+<file path=ppt/notesSlides/notesSlide10.xml><?xml version="1.0" encoding="utf-8"?>
+<p:notes xmlns:a="http://schemas.openxmlformats.org/drawingml/2006/main" xmlns:r="http://schemas.openxmlformats.org/officeDocument/2006/relationships" xmlns:p="http://schemas.openxmlformats.org/presentationml/2006/main">
+  <p:cSld>
+    <p:spTree>
+      <p:nvGrpSpPr>
+        <p:cNvPr id="1" name=""/>
+        <p:cNvGrpSpPr/>
+        <p:nvPr/>
+      </p:nvGrpSpPr>
+      <p:grpSpPr>
+        <a:xfrm>
+          <a:off x="0" y="0"/>
+          <a:ext cx="0" cy="0"/>
+          <a:chOff x="0" y="0"/>
+          <a:chExt cx="0" cy="0"/>
+        </a:xfrm>
+      </p:grpSpPr>
+      <p:sp>
+        <p:nvSpPr>
+          <p:cNvPr id="2" name="Slide Image Placeholder 1"/>
+          <p:cNvSpPr>
+            <a:spLocks noGrp="1" noRot="1" noChangeAspect="1"/>
+          </p:cNvSpPr>
+          <p:nvPr>
+            <p:ph type="sldImg"/>
+          </p:nvPr>
+        </p:nvSpPr>
+        <p:spPr/>
+      </p:sp>
+      <p:sp>
+        <p:nvSpPr>
+          <p:cNvPr id="3" name="Notes Placeholder 2"/>
+          <p:cNvSpPr>
+            <a:spLocks noGrp="1"/>
+          </p:cNvSpPr>
+          <p:nvPr>
+            <p:ph type="body" idx="1"/>
+          </p:nvPr>
+        </p:nvSpPr>
+        <p:spPr/>
+        <p:txBody>
+          <a:bodyPr/>
+          <a:lstStyle/>
+          <a:p>
+            <a:r>
+              <a:rPr lang="en-CA" dirty="0"/>
+              <a:t>I’m still in the process of creating the MIS so I haven’t gotten to this part yet.</a:t>
+            </a:r>
+          </a:p>
+          <a:p>
+            <a:r>
+              <a:rPr lang="en-CA" dirty="0"/>
+              <a:t>Based on the uses diagram I showed earlier we know that this scene module handles the actual application of the light on the scene.</a:t>
+            </a:r>
+          </a:p>
+        </p:txBody>
+      </p:sp>
+      <p:sp>
+        <p:nvSpPr>
+          <p:cNvPr id="4" name="Slide Number Placeholder 3"/>
+          <p:cNvSpPr>
+            <a:spLocks noGrp="1"/>
+          </p:cNvSpPr>
+          <p:nvPr>
+            <p:ph type="sldNum" sz="quarter" idx="5"/>
+          </p:nvPr>
+        </p:nvSpPr>
+        <p:spPr/>
+        <p:txBody>
+          <a:bodyPr/>
+          <a:lstStyle/>
+          <a:p>
+            <a:fld id="{C22109BC-39F4-43B1-850C-D5EB0E6480C8}" type="slidenum">
+              <a:rPr lang="en-US" smtClean="0"/>
+              <a:t>13</a:t>
+            </a:fld>
+            <a:endParaRPr lang="en-US" dirty="0"/>
+          </a:p>
+        </p:txBody>
+      </p:sp>
+    </p:spTree>
+    <p:extLst>
+      <p:ext uri="{BB962C8B-B14F-4D97-AF65-F5344CB8AC3E}">
+        <p14:creationId xmlns:p14="http://schemas.microsoft.com/office/powerpoint/2010/main" val="1327260615"/>
+      </p:ext>
+    </p:extLst>
+  </p:cSld>
+  <p:clrMapOvr>
+    <a:masterClrMapping/>
+  </p:clrMapOvr>
+</p:notes>
+</file>
+
+<file path=ppt/notesSlides/notesSlide11.xml><?xml version="1.0" encoding="utf-8"?>
+<p:notes xmlns:a="http://schemas.openxmlformats.org/drawingml/2006/main" xmlns:r="http://schemas.openxmlformats.org/officeDocument/2006/relationships" xmlns:p="http://schemas.openxmlformats.org/presentationml/2006/main">
+  <p:cSld>
+    <p:spTree>
+      <p:nvGrpSpPr>
+        <p:cNvPr id="1" name=""/>
+        <p:cNvGrpSpPr/>
+        <p:nvPr/>
+      </p:nvGrpSpPr>
+      <p:grpSpPr>
+        <a:xfrm>
+          <a:off x="0" y="0"/>
+          <a:ext cx="0" cy="0"/>
+          <a:chOff x="0" y="0"/>
+          <a:chExt cx="0" cy="0"/>
+        </a:xfrm>
+      </p:grpSpPr>
+      <p:sp>
+        <p:nvSpPr>
+          <p:cNvPr id="2" name="Slide Image Placeholder 1"/>
+          <p:cNvSpPr>
+            <a:spLocks noGrp="1" noRot="1" noChangeAspect="1"/>
+          </p:cNvSpPr>
+          <p:nvPr>
+            <p:ph type="sldImg"/>
+          </p:nvPr>
+        </p:nvSpPr>
+        <p:spPr/>
+      </p:sp>
+      <p:sp>
+        <p:nvSpPr>
+          <p:cNvPr id="3" name="Notes Placeholder 2"/>
+          <p:cNvSpPr>
+            <a:spLocks noGrp="1"/>
+          </p:cNvSpPr>
+          <p:nvPr>
+            <p:ph type="body" idx="1"/>
+          </p:nvPr>
+        </p:nvSpPr>
+        <p:spPr/>
+        <p:txBody>
+          <a:bodyPr/>
+          <a:lstStyle/>
+          <a:p>
+            <a:endParaRPr lang="en-CA" dirty="0"/>
+          </a:p>
+        </p:txBody>
+      </p:sp>
+      <p:sp>
+        <p:nvSpPr>
+          <p:cNvPr id="4" name="Slide Number Placeholder 3"/>
+          <p:cNvSpPr>
+            <a:spLocks noGrp="1"/>
+          </p:cNvSpPr>
+          <p:nvPr>
+            <p:ph type="sldNum" sz="quarter" idx="5"/>
+          </p:nvPr>
+        </p:nvSpPr>
+        <p:spPr/>
+        <p:txBody>
+          <a:bodyPr/>
+          <a:lstStyle/>
+          <a:p>
+            <a:fld id="{C22109BC-39F4-43B1-850C-D5EB0E6480C8}" type="slidenum">
+              <a:rPr lang="en-US" smtClean="0"/>
+              <a:t>14</a:t>
+            </a:fld>
+            <a:endParaRPr lang="en-US" dirty="0"/>
+          </a:p>
+        </p:txBody>
+      </p:sp>
+    </p:spTree>
+    <p:extLst>
+      <p:ext uri="{BB962C8B-B14F-4D97-AF65-F5344CB8AC3E}">
+        <p14:creationId xmlns:p14="http://schemas.microsoft.com/office/powerpoint/2010/main" val="2531002819"/>
+      </p:ext>
+    </p:extLst>
+  </p:cSld>
+  <p:clrMapOvr>
+    <a:masterClrMapping/>
+  </p:clrMapOvr>
+</p:notes>
+</file>
+
+<file path=ppt/notesSlides/notesSlide12.xml><?xml version="1.0" encoding="utf-8"?>
+<p:notes xmlns:a="http://schemas.openxmlformats.org/drawingml/2006/main" xmlns:r="http://schemas.openxmlformats.org/officeDocument/2006/relationships" xmlns:p="http://schemas.openxmlformats.org/presentationml/2006/main">
+  <p:cSld>
+    <p:spTree>
+      <p:nvGrpSpPr>
+        <p:cNvPr id="1" name=""/>
+        <p:cNvGrpSpPr/>
+        <p:nvPr/>
+      </p:nvGrpSpPr>
+      <p:grpSpPr>
+        <a:xfrm>
+          <a:off x="0" y="0"/>
+          <a:ext cx="0" cy="0"/>
+          <a:chOff x="0" y="0"/>
+          <a:chExt cx="0" cy="0"/>
+        </a:xfrm>
+      </p:grpSpPr>
+      <p:sp>
+        <p:nvSpPr>
+          <p:cNvPr id="2" name="Slide Image Placeholder 1"/>
+          <p:cNvSpPr>
+            <a:spLocks noGrp="1" noRot="1" noChangeAspect="1"/>
+          </p:cNvSpPr>
+          <p:nvPr>
+            <p:ph type="sldImg"/>
+          </p:nvPr>
+        </p:nvSpPr>
+        <p:spPr/>
+      </p:sp>
+      <p:sp>
+        <p:nvSpPr>
+          <p:cNvPr id="3" name="Notes Placeholder 2"/>
+          <p:cNvSpPr>
+            <a:spLocks noGrp="1"/>
+          </p:cNvSpPr>
+          <p:nvPr>
+            <p:ph type="body" idx="1"/>
+          </p:nvPr>
+        </p:nvSpPr>
+        <p:spPr/>
+        <p:txBody>
+          <a:bodyPr/>
+          <a:lstStyle/>
+          <a:p>
+            <a:endParaRPr lang="en-CA" dirty="0"/>
+          </a:p>
+        </p:txBody>
+      </p:sp>
+      <p:sp>
+        <p:nvSpPr>
+          <p:cNvPr id="4" name="Slide Number Placeholder 3"/>
+          <p:cNvSpPr>
+            <a:spLocks noGrp="1"/>
+          </p:cNvSpPr>
+          <p:nvPr>
+            <p:ph type="sldNum" sz="quarter" idx="5"/>
+          </p:nvPr>
+        </p:nvSpPr>
+        <p:spPr/>
+        <p:txBody>
+          <a:bodyPr/>
+          <a:lstStyle/>
+          <a:p>
+            <a:fld id="{C22109BC-39F4-43B1-850C-D5EB0E6480C8}" type="slidenum">
+              <a:rPr lang="en-US" smtClean="0"/>
+              <a:t>16</a:t>
+            </a:fld>
+            <a:endParaRPr lang="en-US" dirty="0"/>
+          </a:p>
+        </p:txBody>
+      </p:sp>
+    </p:spTree>
+    <p:extLst>
+      <p:ext uri="{BB962C8B-B14F-4D97-AF65-F5344CB8AC3E}">
+        <p14:creationId xmlns:p14="http://schemas.microsoft.com/office/powerpoint/2010/main" val="2729834519"/>
+      </p:ext>
+    </p:extLst>
+  </p:cSld>
+  <p:clrMapOvr>
+    <a:masterClrMapping/>
+  </p:clrMapOvr>
+</p:notes>
+</file>
+
 <file path=ppt/notesSlides/notesSlide2.xml><?xml version="1.0" encoding="utf-8"?>
 <p:notes xmlns:a="http://schemas.openxmlformats.org/drawingml/2006/main" xmlns:r="http://schemas.openxmlformats.org/officeDocument/2006/relationships" xmlns:p="http://schemas.openxmlformats.org/presentationml/2006/main">
   <p:cSld>
@@ -819,7 +1119,16 @@
           <a:bodyPr/>
           <a:lstStyle/>
           <a:p>
-            <a:endParaRPr lang="en-CA" dirty="0"/>
+            <a:r>
+              <a:rPr lang="en-CA" dirty="0"/>
+              <a:t>I found that the problem domain was split up in a couple of different ways.</a:t>
+            </a:r>
+          </a:p>
+          <a:p>
+            <a:r>
+              <a:rPr lang="en-CA" dirty="0"/>
+              <a:t>So for the scope of my project I decided to focus on understanding these aspects of modeling light in 3D graphics.</a:t>
+            </a:r>
           </a:p>
         </p:txBody>
       </p:sp>
@@ -849,7 +1158,7 @@
     </p:spTree>
     <p:extLst>
       <p:ext uri="{BB962C8B-B14F-4D97-AF65-F5344CB8AC3E}">
-        <p14:creationId xmlns:p14="http://schemas.microsoft.com/office/powerpoint/2010/main" val="1658734182"/>
+        <p14:creationId xmlns:p14="http://schemas.microsoft.com/office/powerpoint/2010/main" val="3589047798"/>
       </p:ext>
     </p:extLst>
   </p:cSld>
@@ -903,10 +1212,7 @@
           <a:bodyPr/>
           <a:lstStyle/>
           <a:p>
-            <a:r>
-              <a:rPr lang="en-CA" dirty="0"/>
-              <a:t>I specifically want to discuss these with you so keep these in mind but we’ll come back to them.</a:t>
-            </a:r>
+            <a:endParaRPr lang="en-CA" dirty="0"/>
           </a:p>
         </p:txBody>
       </p:sp>
@@ -936,7 +1242,7 @@
     </p:spTree>
     <p:extLst>
       <p:ext uri="{BB962C8B-B14F-4D97-AF65-F5344CB8AC3E}">
-        <p14:creationId xmlns:p14="http://schemas.microsoft.com/office/powerpoint/2010/main" val="4225631079"/>
+        <p14:creationId xmlns:p14="http://schemas.microsoft.com/office/powerpoint/2010/main" val="1658734182"/>
       </p:ext>
     </p:extLst>
   </p:cSld>
@@ -992,65 +1298,8 @@
           <a:p>
             <a:r>
               <a:rPr lang="en-CA" dirty="0"/>
-              <a:t>So jumping into this module hierarchy I have 6 behaviour modules, and 2 software decision modules.</a:t>
+              <a:t>I specifically want to discuss these with you so keep these in mind but we’ll come back to them.</a:t>
             </a:r>
-          </a:p>
-          <a:p>
-            <a:endParaRPr lang="en-CA" dirty="0"/>
-          </a:p>
-          <a:p>
-            <a:r>
-              <a:rPr lang="en-CA" dirty="0"/>
-              <a:t>Scene module – handles the environment that’s being rendered (i.e. the room) and sets the boundaries (and constraints) for other properties; it also keeps track of the objects, light sources, and observer in the scene.</a:t>
-            </a:r>
-          </a:p>
-          <a:p>
-            <a:r>
-              <a:rPr lang="en-CA" dirty="0"/>
-              <a:t>Object module – handles the objects being rendered in a scene</a:t>
-            </a:r>
-          </a:p>
-          <a:p>
-            <a:r>
-              <a:rPr lang="en-CA" dirty="0"/>
-              <a:t>Light Source Module – handles the light source</a:t>
-            </a:r>
-          </a:p>
-          <a:p>
-            <a:r>
-              <a:rPr lang="en-CA" dirty="0"/>
-              <a:t>Observer Module – handles the observer information</a:t>
-            </a:r>
-          </a:p>
-          <a:p>
-            <a:r>
-              <a:rPr lang="en-CA" dirty="0"/>
-              <a:t>Shader Module – handles the shading calculations</a:t>
-            </a:r>
-          </a:p>
-          <a:p>
-            <a:r>
-              <a:rPr lang="en-CA" dirty="0"/>
-              <a:t>Lighting Model Module – handles the lighting and colouring calculations</a:t>
-            </a:r>
-          </a:p>
-          <a:p>
-            <a:r>
-              <a:rPr lang="en-CA" dirty="0"/>
-              <a:t>JSON Module – handles interpreting the input and sending that information in properly formatted ways to the other modules as well as turning that same data into output</a:t>
-            </a:r>
-          </a:p>
-          <a:p>
-            <a:endParaRPr lang="en-CA" dirty="0"/>
-          </a:p>
-          <a:p>
-            <a:r>
-              <a:rPr lang="en-CA" dirty="0"/>
-              <a:t>Here’s where I’m not sure if this should be listed – but I need a Vector Calculus module; something that handles the implementation of things like normalizing vectors, adding, subtracting, getting the dot product and cross product that sort of thing.</a:t>
-            </a:r>
-          </a:p>
-          <a:p>
-            <a:endParaRPr lang="en-CA" dirty="0"/>
           </a:p>
         </p:txBody>
       </p:sp>
@@ -1080,7 +1329,7 @@
     </p:spTree>
     <p:extLst>
       <p:ext uri="{BB962C8B-B14F-4D97-AF65-F5344CB8AC3E}">
-        <p14:creationId xmlns:p14="http://schemas.microsoft.com/office/powerpoint/2010/main" val="196732570"/>
+        <p14:creationId xmlns:p14="http://schemas.microsoft.com/office/powerpoint/2010/main" val="4225631079"/>
       </p:ext>
     </p:extLst>
   </p:cSld>
@@ -1136,6 +1385,150 @@
           <a:p>
             <a:r>
               <a:rPr lang="en-CA" dirty="0"/>
+              <a:t>So jumping into this module hierarchy I have 6 behaviour modules, and 2 software decision modules.</a:t>
+            </a:r>
+          </a:p>
+          <a:p>
+            <a:endParaRPr lang="en-CA" dirty="0"/>
+          </a:p>
+          <a:p>
+            <a:r>
+              <a:rPr lang="en-CA" dirty="0"/>
+              <a:t>Scene module – handles the environment that’s being rendered (i.e. the room) and sets the boundaries (and constraints) for other properties; it also keeps track of the objects, light sources, and observer in the scene.</a:t>
+            </a:r>
+          </a:p>
+          <a:p>
+            <a:r>
+              <a:rPr lang="en-CA" dirty="0"/>
+              <a:t>Object module – handles the objects being rendered in a scene</a:t>
+            </a:r>
+          </a:p>
+          <a:p>
+            <a:r>
+              <a:rPr lang="en-CA" dirty="0"/>
+              <a:t>Light Source Module – handles the light source</a:t>
+            </a:r>
+          </a:p>
+          <a:p>
+            <a:r>
+              <a:rPr lang="en-CA" dirty="0"/>
+              <a:t>Observer Module – handles the observer information</a:t>
+            </a:r>
+          </a:p>
+          <a:p>
+            <a:r>
+              <a:rPr lang="en-CA" dirty="0"/>
+              <a:t>Shader Module – handles the shading calculations</a:t>
+            </a:r>
+          </a:p>
+          <a:p>
+            <a:r>
+              <a:rPr lang="en-CA" dirty="0"/>
+              <a:t>Lighting Model Module – handles the lighting and colouring calculations</a:t>
+            </a:r>
+          </a:p>
+          <a:p>
+            <a:r>
+              <a:rPr lang="en-CA" dirty="0"/>
+              <a:t>JSON Module – handles interpreting the input and sending that information in properly formatted ways to the other modules as well as turning that same data into output</a:t>
+            </a:r>
+          </a:p>
+          <a:p>
+            <a:endParaRPr lang="en-CA" dirty="0"/>
+          </a:p>
+          <a:p>
+            <a:r>
+              <a:rPr lang="en-CA" dirty="0"/>
+              <a:t>Here’s where I’m not sure if this should be listed – but I need a Vector Calculus module; something that handles the implementation of things like normalizing vectors, adding, subtracting, getting the dot product and cross product that sort of thing.</a:t>
+            </a:r>
+          </a:p>
+          <a:p>
+            <a:endParaRPr lang="en-CA" dirty="0"/>
+          </a:p>
+        </p:txBody>
+      </p:sp>
+      <p:sp>
+        <p:nvSpPr>
+          <p:cNvPr id="4" name="Slide Number Placeholder 3"/>
+          <p:cNvSpPr>
+            <a:spLocks noGrp="1"/>
+          </p:cNvSpPr>
+          <p:nvPr>
+            <p:ph type="sldNum" sz="quarter" idx="5"/>
+          </p:nvPr>
+        </p:nvSpPr>
+        <p:spPr/>
+        <p:txBody>
+          <a:bodyPr/>
+          <a:lstStyle/>
+          <a:p>
+            <a:fld id="{C22109BC-39F4-43B1-850C-D5EB0E6480C8}" type="slidenum">
+              <a:rPr lang="en-US" smtClean="0"/>
+              <a:t>6</a:t>
+            </a:fld>
+            <a:endParaRPr lang="en-US" dirty="0"/>
+          </a:p>
+        </p:txBody>
+      </p:sp>
+    </p:spTree>
+    <p:extLst>
+      <p:ext uri="{BB962C8B-B14F-4D97-AF65-F5344CB8AC3E}">
+        <p14:creationId xmlns:p14="http://schemas.microsoft.com/office/powerpoint/2010/main" val="196732570"/>
+      </p:ext>
+    </p:extLst>
+  </p:cSld>
+  <p:clrMapOvr>
+    <a:masterClrMapping/>
+  </p:clrMapOvr>
+</p:notes>
+</file>
+
+<file path=ppt/notesSlides/notesSlide6.xml><?xml version="1.0" encoding="utf-8"?>
+<p:notes xmlns:a="http://schemas.openxmlformats.org/drawingml/2006/main" xmlns:r="http://schemas.openxmlformats.org/officeDocument/2006/relationships" xmlns:p="http://schemas.openxmlformats.org/presentationml/2006/main">
+  <p:cSld>
+    <p:spTree>
+      <p:nvGrpSpPr>
+        <p:cNvPr id="1" name=""/>
+        <p:cNvGrpSpPr/>
+        <p:nvPr/>
+      </p:nvGrpSpPr>
+      <p:grpSpPr>
+        <a:xfrm>
+          <a:off x="0" y="0"/>
+          <a:ext cx="0" cy="0"/>
+          <a:chOff x="0" y="0"/>
+          <a:chExt cx="0" cy="0"/>
+        </a:xfrm>
+      </p:grpSpPr>
+      <p:sp>
+        <p:nvSpPr>
+          <p:cNvPr id="2" name="Slide Image Placeholder 1"/>
+          <p:cNvSpPr>
+            <a:spLocks noGrp="1" noRot="1" noChangeAspect="1"/>
+          </p:cNvSpPr>
+          <p:nvPr>
+            <p:ph type="sldImg"/>
+          </p:nvPr>
+        </p:nvSpPr>
+        <p:spPr/>
+      </p:sp>
+      <p:sp>
+        <p:nvSpPr>
+          <p:cNvPr id="3" name="Notes Placeholder 2"/>
+          <p:cNvSpPr>
+            <a:spLocks noGrp="1"/>
+          </p:cNvSpPr>
+          <p:nvPr>
+            <p:ph type="body" idx="1"/>
+          </p:nvPr>
+        </p:nvSpPr>
+        <p:spPr/>
+        <p:txBody>
+          <a:bodyPr/>
+          <a:lstStyle/>
+          <a:p>
+            <a:r>
+              <a:rPr lang="en-CA" dirty="0"/>
               <a:t>So I have conceptual issues.</a:t>
             </a:r>
           </a:p>
@@ -1194,15 +1587,7 @@
           <a:p>
             <a:r>
               <a:rPr lang="en-CA" dirty="0"/>
-              <a:t>My last is that I don’t know what to do with these three modules; they’re necessary hold </a:t>
-            </a:r>
-            <a:r>
-              <a:rPr lang="en-CA" dirty="0" err="1"/>
-              <a:t>hold</a:t>
-            </a:r>
-            <a:r>
-              <a:rPr lang="en-CA" dirty="0"/>
-              <a:t> information about the Observer,</a:t>
+              <a:t>My last is that I don’t know what to do with these three modules; they’re necessary to hold information about the Observer, Scene, and other data structures that will be used by  the modules associated to my changes.</a:t>
             </a:r>
           </a:p>
         </p:txBody>
@@ -1224,7 +1609,7 @@
           <a:p>
             <a:fld id="{C22109BC-39F4-43B1-850C-D5EB0E6480C8}" type="slidenum">
               <a:rPr lang="en-US" smtClean="0"/>
-              <a:t>6</a:t>
+              <a:t>7</a:t>
             </a:fld>
             <a:endParaRPr lang="en-US" dirty="0"/>
           </a:p>
@@ -1234,6 +1619,342 @@
     <p:extLst>
       <p:ext uri="{BB962C8B-B14F-4D97-AF65-F5344CB8AC3E}">
         <p14:creationId xmlns:p14="http://schemas.microsoft.com/office/powerpoint/2010/main" val="132412442"/>
+      </p:ext>
+    </p:extLst>
+  </p:cSld>
+  <p:clrMapOvr>
+    <a:masterClrMapping/>
+  </p:clrMapOvr>
+</p:notes>
+</file>
+
+<file path=ppt/notesSlides/notesSlide7.xml><?xml version="1.0" encoding="utf-8"?>
+<p:notes xmlns:a="http://schemas.openxmlformats.org/drawingml/2006/main" xmlns:r="http://schemas.openxmlformats.org/officeDocument/2006/relationships" xmlns:p="http://schemas.openxmlformats.org/presentationml/2006/main">
+  <p:cSld>
+    <p:spTree>
+      <p:nvGrpSpPr>
+        <p:cNvPr id="1" name=""/>
+        <p:cNvGrpSpPr/>
+        <p:nvPr/>
+      </p:nvGrpSpPr>
+      <p:grpSpPr>
+        <a:xfrm>
+          <a:off x="0" y="0"/>
+          <a:ext cx="0" cy="0"/>
+          <a:chOff x="0" y="0"/>
+          <a:chExt cx="0" cy="0"/>
+        </a:xfrm>
+      </p:grpSpPr>
+      <p:sp>
+        <p:nvSpPr>
+          <p:cNvPr id="2" name="Slide Image Placeholder 1"/>
+          <p:cNvSpPr>
+            <a:spLocks noGrp="1" noRot="1" noChangeAspect="1"/>
+          </p:cNvSpPr>
+          <p:nvPr>
+            <p:ph type="sldImg"/>
+          </p:nvPr>
+        </p:nvSpPr>
+        <p:spPr/>
+      </p:sp>
+      <p:sp>
+        <p:nvSpPr>
+          <p:cNvPr id="3" name="Notes Placeholder 2"/>
+          <p:cNvSpPr>
+            <a:spLocks noGrp="1"/>
+          </p:cNvSpPr>
+          <p:nvPr>
+            <p:ph type="body" idx="1"/>
+          </p:nvPr>
+        </p:nvSpPr>
+        <p:spPr/>
+        <p:txBody>
+          <a:bodyPr/>
+          <a:lstStyle/>
+          <a:p>
+            <a:r>
+              <a:rPr lang="en-CA" dirty="0"/>
+              <a:t>So this messy diagram is my current iteration of the uses hierarchy.</a:t>
+            </a:r>
+          </a:p>
+          <a:p>
+            <a:endParaRPr lang="en-CA" dirty="0"/>
+          </a:p>
+          <a:p>
+            <a:r>
+              <a:rPr lang="en-CA" dirty="0"/>
+              <a:t>Basically my main module is the scene module. It’s where all the information about the objects, observers, and light sources are stored.</a:t>
+            </a:r>
+          </a:p>
+          <a:p>
+            <a:r>
+              <a:rPr lang="en-CA" dirty="0"/>
+              <a:t>It’s also where final calculations from the lighting and shading models get applied to these objects.</a:t>
+            </a:r>
+          </a:p>
+          <a:p>
+            <a:r>
+              <a:rPr lang="en-CA" dirty="0"/>
+              <a:t>It is the only module that interfaces with the JSON module, as it’s the only one that reads input and writes output.</a:t>
+            </a:r>
+          </a:p>
+          <a:p>
+            <a:endParaRPr lang="en-CA" dirty="0"/>
+          </a:p>
+          <a:p>
+            <a:r>
+              <a:rPr lang="en-CA" dirty="0"/>
+              <a:t>Observer, Object, and Light Source are all abstract object modules; they’re basically just data types.</a:t>
+            </a:r>
+          </a:p>
+          <a:p>
+            <a:endParaRPr lang="en-CA" dirty="0"/>
+          </a:p>
+          <a:p>
+            <a:r>
+              <a:rPr lang="en-CA" dirty="0"/>
+              <a:t>The lighting and shading models are where calculations happen.</a:t>
+            </a:r>
+          </a:p>
+          <a:p>
+            <a:endParaRPr lang="en-CA" dirty="0"/>
+          </a:p>
+          <a:p>
+            <a:r>
+              <a:rPr lang="en-CA" dirty="0"/>
+              <a:t>Does this make sense?</a:t>
+            </a:r>
+          </a:p>
+        </p:txBody>
+      </p:sp>
+      <p:sp>
+        <p:nvSpPr>
+          <p:cNvPr id="4" name="Slide Number Placeholder 3"/>
+          <p:cNvSpPr>
+            <a:spLocks noGrp="1"/>
+          </p:cNvSpPr>
+          <p:nvPr>
+            <p:ph type="sldNum" sz="quarter" idx="5"/>
+          </p:nvPr>
+        </p:nvSpPr>
+        <p:spPr/>
+        <p:txBody>
+          <a:bodyPr/>
+          <a:lstStyle/>
+          <a:p>
+            <a:fld id="{C22109BC-39F4-43B1-850C-D5EB0E6480C8}" type="slidenum">
+              <a:rPr lang="en-US" smtClean="0"/>
+              <a:t>8</a:t>
+            </a:fld>
+            <a:endParaRPr lang="en-US" dirty="0"/>
+          </a:p>
+        </p:txBody>
+      </p:sp>
+    </p:spTree>
+    <p:extLst>
+      <p:ext uri="{BB962C8B-B14F-4D97-AF65-F5344CB8AC3E}">
+        <p14:creationId xmlns:p14="http://schemas.microsoft.com/office/powerpoint/2010/main" val="3206574887"/>
+      </p:ext>
+    </p:extLst>
+  </p:cSld>
+  <p:clrMapOvr>
+    <a:masterClrMapping/>
+  </p:clrMapOvr>
+</p:notes>
+</file>
+
+<file path=ppt/notesSlides/notesSlide8.xml><?xml version="1.0" encoding="utf-8"?>
+<p:notes xmlns:a="http://schemas.openxmlformats.org/drawingml/2006/main" xmlns:r="http://schemas.openxmlformats.org/officeDocument/2006/relationships" xmlns:p="http://schemas.openxmlformats.org/presentationml/2006/main">
+  <p:cSld>
+    <p:spTree>
+      <p:nvGrpSpPr>
+        <p:cNvPr id="1" name=""/>
+        <p:cNvGrpSpPr/>
+        <p:nvPr/>
+      </p:nvGrpSpPr>
+      <p:grpSpPr>
+        <a:xfrm>
+          <a:off x="0" y="0"/>
+          <a:ext cx="0" cy="0"/>
+          <a:chOff x="0" y="0"/>
+          <a:chExt cx="0" cy="0"/>
+        </a:xfrm>
+      </p:grpSpPr>
+      <p:sp>
+        <p:nvSpPr>
+          <p:cNvPr id="2" name="Slide Image Placeholder 1"/>
+          <p:cNvSpPr>
+            <a:spLocks noGrp="1" noRot="1" noChangeAspect="1"/>
+          </p:cNvSpPr>
+          <p:nvPr>
+            <p:ph type="sldImg"/>
+          </p:nvPr>
+        </p:nvSpPr>
+        <p:spPr/>
+      </p:sp>
+      <p:sp>
+        <p:nvSpPr>
+          <p:cNvPr id="3" name="Notes Placeholder 2"/>
+          <p:cNvSpPr>
+            <a:spLocks noGrp="1"/>
+          </p:cNvSpPr>
+          <p:nvPr>
+            <p:ph type="body" idx="1"/>
+          </p:nvPr>
+        </p:nvSpPr>
+        <p:spPr/>
+        <p:txBody>
+          <a:bodyPr/>
+          <a:lstStyle/>
+          <a:p>
+            <a:r>
+              <a:rPr lang="en-CA" dirty="0"/>
+              <a:t>So for the object module it’s just an abstract object – we’re only looking to store data in it about objects that we can then access with our other modules to make their calculations.</a:t>
+            </a:r>
+          </a:p>
+          <a:p>
+            <a:endParaRPr lang="en-CA" dirty="0"/>
+          </a:p>
+          <a:p>
+            <a:r>
+              <a:rPr lang="en-CA" dirty="0"/>
+              <a:t>I want to clarify with the class (and Dr. Smith) that MIS are the access programs – but that means even the internal access right?</a:t>
+            </a:r>
+          </a:p>
+          <a:p>
+            <a:endParaRPr lang="en-CA" dirty="0"/>
+          </a:p>
+          <a:p>
+            <a:endParaRPr lang="en-CA" dirty="0"/>
+          </a:p>
+        </p:txBody>
+      </p:sp>
+      <p:sp>
+        <p:nvSpPr>
+          <p:cNvPr id="4" name="Slide Number Placeholder 3"/>
+          <p:cNvSpPr>
+            <a:spLocks noGrp="1"/>
+          </p:cNvSpPr>
+          <p:nvPr>
+            <p:ph type="sldNum" sz="quarter" idx="5"/>
+          </p:nvPr>
+        </p:nvSpPr>
+        <p:spPr/>
+        <p:txBody>
+          <a:bodyPr/>
+          <a:lstStyle/>
+          <a:p>
+            <a:fld id="{C22109BC-39F4-43B1-850C-D5EB0E6480C8}" type="slidenum">
+              <a:rPr lang="en-US" smtClean="0"/>
+              <a:t>9</a:t>
+            </a:fld>
+            <a:endParaRPr lang="en-US" dirty="0"/>
+          </a:p>
+        </p:txBody>
+      </p:sp>
+    </p:spTree>
+    <p:extLst>
+      <p:ext uri="{BB962C8B-B14F-4D97-AF65-F5344CB8AC3E}">
+        <p14:creationId xmlns:p14="http://schemas.microsoft.com/office/powerpoint/2010/main" val="1574606112"/>
+      </p:ext>
+    </p:extLst>
+  </p:cSld>
+  <p:clrMapOvr>
+    <a:masterClrMapping/>
+  </p:clrMapOvr>
+</p:notes>
+</file>
+
+<file path=ppt/notesSlides/notesSlide9.xml><?xml version="1.0" encoding="utf-8"?>
+<p:notes xmlns:a="http://schemas.openxmlformats.org/drawingml/2006/main" xmlns:r="http://schemas.openxmlformats.org/officeDocument/2006/relationships" xmlns:p="http://schemas.openxmlformats.org/presentationml/2006/main">
+  <p:cSld>
+    <p:spTree>
+      <p:nvGrpSpPr>
+        <p:cNvPr id="1" name=""/>
+        <p:cNvGrpSpPr/>
+        <p:nvPr/>
+      </p:nvGrpSpPr>
+      <p:grpSpPr>
+        <a:xfrm>
+          <a:off x="0" y="0"/>
+          <a:ext cx="0" cy="0"/>
+          <a:chOff x="0" y="0"/>
+          <a:chExt cx="0" cy="0"/>
+        </a:xfrm>
+      </p:grpSpPr>
+      <p:sp>
+        <p:nvSpPr>
+          <p:cNvPr id="2" name="Slide Image Placeholder 1"/>
+          <p:cNvSpPr>
+            <a:spLocks noGrp="1" noRot="1" noChangeAspect="1"/>
+          </p:cNvSpPr>
+          <p:nvPr>
+            <p:ph type="sldImg"/>
+          </p:nvPr>
+        </p:nvSpPr>
+        <p:spPr/>
+      </p:sp>
+      <p:sp>
+        <p:nvSpPr>
+          <p:cNvPr id="3" name="Notes Placeholder 2"/>
+          <p:cNvSpPr>
+            <a:spLocks noGrp="1"/>
+          </p:cNvSpPr>
+          <p:nvPr>
+            <p:ph type="body" idx="1"/>
+          </p:nvPr>
+        </p:nvSpPr>
+        <p:spPr/>
+        <p:txBody>
+          <a:bodyPr/>
+          <a:lstStyle/>
+          <a:p>
+            <a:r>
+              <a:rPr lang="en-CA" dirty="0"/>
+              <a:t>So I don’t want to bore you with repeating the same getters and setters over again.</a:t>
+            </a:r>
+          </a:p>
+          <a:p>
+            <a:r>
+              <a:rPr lang="en-CA" dirty="0"/>
+              <a:t>The specific wording is in my document, but to explain more about this particular module we’ll take a look at the object creation functions Init.</a:t>
+            </a:r>
+          </a:p>
+          <a:p>
+            <a:r>
+              <a:rPr lang="en-CA" dirty="0"/>
+              <a:t>So I’m not sure if I’m using the transition line in the right sense – I interpreted it as changes to the system that aren’t necessarily output; so I put  object creation here – is this correct?</a:t>
+            </a:r>
+          </a:p>
+        </p:txBody>
+      </p:sp>
+      <p:sp>
+        <p:nvSpPr>
+          <p:cNvPr id="4" name="Slide Number Placeholder 3"/>
+          <p:cNvSpPr>
+            <a:spLocks noGrp="1"/>
+          </p:cNvSpPr>
+          <p:nvPr>
+            <p:ph type="sldNum" sz="quarter" idx="5"/>
+          </p:nvPr>
+        </p:nvSpPr>
+        <p:spPr/>
+        <p:txBody>
+          <a:bodyPr/>
+          <a:lstStyle/>
+          <a:p>
+            <a:fld id="{C22109BC-39F4-43B1-850C-D5EB0E6480C8}" type="slidenum">
+              <a:rPr lang="en-US" smtClean="0"/>
+              <a:t>11</a:t>
+            </a:fld>
+            <a:endParaRPr lang="en-US" dirty="0"/>
+          </a:p>
+        </p:txBody>
+      </p:sp>
+    </p:spTree>
+    <p:extLst>
+      <p:ext uri="{BB962C8B-B14F-4D97-AF65-F5344CB8AC3E}">
+        <p14:creationId xmlns:p14="http://schemas.microsoft.com/office/powerpoint/2010/main" val="1555859010"/>
       </p:ext>
     </p:extLst>
   </p:cSld>
@@ -6887,7 +7608,7 @@
           </a:ln>
           <a:extLst>
             <a:ext uri="{C572A759-6A51-4108-AA02-DFA0A04FC94B}">
-              <ma14:wrappingTextBoxFlag xmlns="" xmlns:ma14="http://schemas.microsoft.com/office/mac/drawingml/2011/main" val="1"/>
+              <ma14:wrappingTextBoxFlag xmlns:ma14="http://schemas.microsoft.com/office/mac/drawingml/2011/main" xmlns="" val="1"/>
             </a:ext>
           </a:extLst>
         </p:spPr>
@@ -7615,37 +8336,12 @@
           <a:chExt cx="0" cy="0"/>
         </a:xfrm>
       </p:grpSpPr>
-      <p:sp>
-        <p:nvSpPr>
-          <p:cNvPr id="3" name="Title 2">
-            <a:extLst>
-              <a:ext uri="{FF2B5EF4-FFF2-40B4-BE49-F238E27FC236}">
-                <a16:creationId xmlns:a16="http://schemas.microsoft.com/office/drawing/2014/main" id="{2550E552-4C39-48F4-A115-DEDC07031B9E}"/>
-              </a:ext>
-            </a:extLst>
-          </p:cNvPr>
-          <p:cNvSpPr>
-            <a:spLocks noGrp="1"/>
-          </p:cNvSpPr>
-          <p:nvPr>
-            <p:ph type="title"/>
-          </p:nvPr>
-        </p:nvSpPr>
-        <p:spPr/>
-        <p:txBody>
-          <a:bodyPr/>
-          <a:lstStyle/>
-          <a:p>
-            <a:endParaRPr lang="en-CA"/>
-          </a:p>
-        </p:txBody>
-      </p:sp>
       <p:pic>
         <p:nvPicPr>
           <p:cNvPr id="4" name="Picture 3">
             <a:extLst>
               <a:ext uri="{FF2B5EF4-FFF2-40B4-BE49-F238E27FC236}">
-                <a16:creationId xmlns:a16="http://schemas.microsoft.com/office/drawing/2014/main" id="{391BD27F-419C-4456-8B8D-F1791D3D3FAD}"/>
+                <a16:creationId xmlns:a16="http://schemas.microsoft.com/office/drawing/2014/main" id="{8DDA3F73-0388-4DAC-BAE4-19B7E348FE69}"/>
               </a:ext>
             </a:extLst>
           </p:cNvPr>
@@ -7662,8 +8358,8 @@
         </p:blipFill>
         <p:spPr>
           <a:xfrm>
-            <a:off x="0" y="2076862"/>
-            <a:ext cx="12192000" cy="2704275"/>
+            <a:off x="3011826" y="598291"/>
+            <a:ext cx="5200650" cy="5391150"/>
           </a:xfrm>
           <a:prstGeom prst="rect">
             <a:avLst/>
@@ -7673,7 +8369,7 @@
     </p:spTree>
     <p:extLst>
       <p:ext uri="{BB962C8B-B14F-4D97-AF65-F5344CB8AC3E}">
-        <p14:creationId xmlns:p14="http://schemas.microsoft.com/office/powerpoint/2010/main" val="3900597756"/>
+        <p14:creationId xmlns:p14="http://schemas.microsoft.com/office/powerpoint/2010/main" val="3680918670"/>
       </p:ext>
     </p:extLst>
   </p:cSld>
@@ -7700,37 +8396,12 @@
           <a:chExt cx="0" cy="0"/>
         </a:xfrm>
       </p:grpSpPr>
-      <p:sp>
-        <p:nvSpPr>
-          <p:cNvPr id="3" name="Title 2">
-            <a:extLst>
-              <a:ext uri="{FF2B5EF4-FFF2-40B4-BE49-F238E27FC236}">
-                <a16:creationId xmlns:a16="http://schemas.microsoft.com/office/drawing/2014/main" id="{5EFA8BD5-F33D-4602-A121-4A773FC56544}"/>
-              </a:ext>
-            </a:extLst>
-          </p:cNvPr>
-          <p:cNvSpPr>
-            <a:spLocks noGrp="1"/>
-          </p:cNvSpPr>
-          <p:nvPr>
-            <p:ph type="title"/>
-          </p:nvPr>
-        </p:nvSpPr>
-        <p:spPr/>
-        <p:txBody>
-          <a:bodyPr/>
-          <a:lstStyle/>
-          <a:p>
-            <a:endParaRPr lang="en-CA"/>
-          </a:p>
-        </p:txBody>
-      </p:sp>
       <p:pic>
         <p:nvPicPr>
           <p:cNvPr id="4" name="Picture 3">
             <a:extLst>
               <a:ext uri="{FF2B5EF4-FFF2-40B4-BE49-F238E27FC236}">
-                <a16:creationId xmlns:a16="http://schemas.microsoft.com/office/drawing/2014/main" id="{84436323-54C9-41EA-A73C-9C3033AF4578}"/>
+                <a16:creationId xmlns:a16="http://schemas.microsoft.com/office/drawing/2014/main" id="{0A009E3D-3293-4E20-BF15-1B06A3C2C44D}"/>
               </a:ext>
             </a:extLst>
           </p:cNvPr>
@@ -7740,15 +8411,53 @@
           <p:nvPr/>
         </p:nvPicPr>
         <p:blipFill>
-          <a:blip r:embed="rId2"/>
+          <a:blip r:embed="rId3"/>
           <a:stretch>
             <a:fillRect/>
           </a:stretch>
         </p:blipFill>
         <p:spPr>
           <a:xfrm>
-            <a:off x="0" y="2033629"/>
-            <a:ext cx="12192000" cy="2790741"/>
+            <a:off x="802621" y="494691"/>
+            <a:ext cx="10901082" cy="2219429"/>
+          </a:xfrm>
+          <a:prstGeom prst="rect">
+            <a:avLst/>
+          </a:prstGeom>
+          <a:ln w="38100">
+            <a:solidFill>
+              <a:schemeClr val="accent1">
+                <a:lumMod val="60000"/>
+                <a:lumOff val="40000"/>
+              </a:schemeClr>
+            </a:solidFill>
+          </a:ln>
+        </p:spPr>
+      </p:pic>
+      <p:pic>
+        <p:nvPicPr>
+          <p:cNvPr id="2" name="Picture 1">
+            <a:extLst>
+              <a:ext uri="{FF2B5EF4-FFF2-40B4-BE49-F238E27FC236}">
+                <a16:creationId xmlns:a16="http://schemas.microsoft.com/office/drawing/2014/main" id="{D0C5D53D-B70A-4809-AA05-867854A53C58}"/>
+              </a:ext>
+            </a:extLst>
+          </p:cNvPr>
+          <p:cNvPicPr>
+            <a:picLocks noChangeAspect="1"/>
+          </p:cNvPicPr>
+          <p:nvPr/>
+        </p:nvPicPr>
+        <p:blipFill>
+          <a:blip r:embed="rId4"/>
+          <a:stretch>
+            <a:fillRect/>
+          </a:stretch>
+        </p:blipFill>
+        <p:spPr>
+          <a:xfrm>
+            <a:off x="314325" y="3119355"/>
+            <a:ext cx="11877675" cy="2686050"/>
           </a:xfrm>
           <a:prstGeom prst="rect">
             <a:avLst/>
@@ -7758,7 +8467,7 @@
     </p:spTree>
     <p:extLst>
       <p:ext uri="{BB962C8B-B14F-4D97-AF65-F5344CB8AC3E}">
-        <p14:creationId xmlns:p14="http://schemas.microsoft.com/office/powerpoint/2010/main" val="2728739638"/>
+        <p14:creationId xmlns:p14="http://schemas.microsoft.com/office/powerpoint/2010/main" val="3448348594"/>
       </p:ext>
     </p:extLst>
   </p:cSld>
@@ -7785,37 +8494,12 @@
           <a:chExt cx="0" cy="0"/>
         </a:xfrm>
       </p:grpSpPr>
-      <p:sp>
-        <p:nvSpPr>
-          <p:cNvPr id="3" name="Title 2">
-            <a:extLst>
-              <a:ext uri="{FF2B5EF4-FFF2-40B4-BE49-F238E27FC236}">
-                <a16:creationId xmlns:a16="http://schemas.microsoft.com/office/drawing/2014/main" id="{D81D7BF7-B3A6-42D6-9E47-8BB0F1778A72}"/>
-              </a:ext>
-            </a:extLst>
-          </p:cNvPr>
-          <p:cNvSpPr>
-            <a:spLocks noGrp="1"/>
-          </p:cNvSpPr>
-          <p:nvPr>
-            <p:ph type="title"/>
-          </p:nvPr>
-        </p:nvSpPr>
-        <p:spPr/>
-        <p:txBody>
-          <a:bodyPr/>
-          <a:lstStyle/>
-          <a:p>
-            <a:endParaRPr lang="en-CA"/>
-          </a:p>
-        </p:txBody>
-      </p:sp>
       <p:pic>
         <p:nvPicPr>
           <p:cNvPr id="4" name="Picture 3">
             <a:extLst>
               <a:ext uri="{FF2B5EF4-FFF2-40B4-BE49-F238E27FC236}">
-                <a16:creationId xmlns:a16="http://schemas.microsoft.com/office/drawing/2014/main" id="{D8FCDEDD-0A10-4BA0-8223-3204B9CF8702}"/>
+                <a16:creationId xmlns:a16="http://schemas.microsoft.com/office/drawing/2014/main" id="{CD0AFC2B-3890-4CDE-A7B6-86FCDD954E09}"/>
               </a:ext>
             </a:extLst>
           </p:cNvPr>
@@ -7832,8 +8516,46 @@
         </p:blipFill>
         <p:spPr>
           <a:xfrm>
-            <a:off x="0" y="2105733"/>
-            <a:ext cx="12192000" cy="2646534"/>
+            <a:off x="912465" y="378116"/>
+            <a:ext cx="10901082" cy="2417940"/>
+          </a:xfrm>
+          <a:prstGeom prst="rect">
+            <a:avLst/>
+          </a:prstGeom>
+          <a:ln w="38100">
+            <a:solidFill>
+              <a:schemeClr val="accent1">
+                <a:lumMod val="60000"/>
+                <a:lumOff val="40000"/>
+              </a:schemeClr>
+            </a:solidFill>
+          </a:ln>
+        </p:spPr>
+      </p:pic>
+      <p:pic>
+        <p:nvPicPr>
+          <p:cNvPr id="5" name="Picture 4">
+            <a:extLst>
+              <a:ext uri="{FF2B5EF4-FFF2-40B4-BE49-F238E27FC236}">
+                <a16:creationId xmlns:a16="http://schemas.microsoft.com/office/drawing/2014/main" id="{588BB337-6069-40FC-91D0-5996106E4137}"/>
+              </a:ext>
+            </a:extLst>
+          </p:cNvPr>
+          <p:cNvPicPr>
+            <a:picLocks noChangeAspect="1"/>
+          </p:cNvPicPr>
+          <p:nvPr/>
+        </p:nvPicPr>
+        <p:blipFill>
+          <a:blip r:embed="rId3"/>
+          <a:stretch>
+            <a:fillRect/>
+          </a:stretch>
+        </p:blipFill>
+        <p:spPr>
+          <a:xfrm>
+            <a:off x="686106" y="3261724"/>
+            <a:ext cx="11353800" cy="2800350"/>
           </a:xfrm>
           <a:prstGeom prst="rect">
             <a:avLst/>
@@ -7843,7 +8565,7 @@
     </p:spTree>
     <p:extLst>
       <p:ext uri="{BB962C8B-B14F-4D97-AF65-F5344CB8AC3E}">
-        <p14:creationId xmlns:p14="http://schemas.microsoft.com/office/powerpoint/2010/main" val="1465849013"/>
+        <p14:creationId xmlns:p14="http://schemas.microsoft.com/office/powerpoint/2010/main" val="1294100339"/>
       </p:ext>
     </p:extLst>
   </p:cSld>
@@ -7870,6 +8592,180 @@
           <a:chExt cx="0" cy="0"/>
         </a:xfrm>
       </p:grpSpPr>
+      <p:pic>
+        <p:nvPicPr>
+          <p:cNvPr id="5" name="Picture 4">
+            <a:extLst>
+              <a:ext uri="{FF2B5EF4-FFF2-40B4-BE49-F238E27FC236}">
+                <a16:creationId xmlns:a16="http://schemas.microsoft.com/office/drawing/2014/main" id="{379CCC0A-A26A-4461-AC19-5B8CED8FA6AB}"/>
+              </a:ext>
+            </a:extLst>
+          </p:cNvPr>
+          <p:cNvPicPr>
+            <a:picLocks noChangeAspect="1"/>
+          </p:cNvPicPr>
+          <p:nvPr/>
+        </p:nvPicPr>
+        <p:blipFill>
+          <a:blip r:embed="rId3"/>
+          <a:stretch>
+            <a:fillRect/>
+          </a:stretch>
+        </p:blipFill>
+        <p:spPr>
+          <a:xfrm>
+            <a:off x="221777" y="2176510"/>
+            <a:ext cx="11748445" cy="2504979"/>
+          </a:xfrm>
+          <a:prstGeom prst="rect">
+            <a:avLst/>
+          </a:prstGeom>
+          <a:ln w="38100">
+            <a:solidFill>
+              <a:schemeClr val="accent1">
+                <a:lumMod val="60000"/>
+                <a:lumOff val="40000"/>
+              </a:schemeClr>
+            </a:solidFill>
+          </a:ln>
+        </p:spPr>
+      </p:pic>
+    </p:spTree>
+    <p:extLst>
+      <p:ext uri="{BB962C8B-B14F-4D97-AF65-F5344CB8AC3E}">
+        <p14:creationId xmlns:p14="http://schemas.microsoft.com/office/powerpoint/2010/main" val="2142511003"/>
+      </p:ext>
+    </p:extLst>
+  </p:cSld>
+  <p:clrMapOvr>
+    <a:masterClrMapping/>
+  </p:clrMapOvr>
+</p:sld>
+</file>
+
+<file path=ppt/slides/slide14.xml><?xml version="1.0" encoding="utf-8"?>
+<p:sld xmlns:a="http://schemas.openxmlformats.org/drawingml/2006/main" xmlns:r="http://schemas.openxmlformats.org/officeDocument/2006/relationships" xmlns:p="http://schemas.openxmlformats.org/presentationml/2006/main">
+  <p:cSld>
+    <p:spTree>
+      <p:nvGrpSpPr>
+        <p:cNvPr id="1" name=""/>
+        <p:cNvGrpSpPr/>
+        <p:nvPr/>
+      </p:nvGrpSpPr>
+      <p:grpSpPr>
+        <a:xfrm>
+          <a:off x="0" y="0"/>
+          <a:ext cx="0" cy="0"/>
+          <a:chOff x="0" y="0"/>
+          <a:chExt cx="0" cy="0"/>
+        </a:xfrm>
+      </p:grpSpPr>
+      <p:pic>
+        <p:nvPicPr>
+          <p:cNvPr id="4" name="Picture 3">
+            <a:extLst>
+              <a:ext uri="{FF2B5EF4-FFF2-40B4-BE49-F238E27FC236}">
+                <a16:creationId xmlns:a16="http://schemas.microsoft.com/office/drawing/2014/main" id="{84436323-54C9-41EA-A73C-9C3033AF4578}"/>
+              </a:ext>
+            </a:extLst>
+          </p:cNvPr>
+          <p:cNvPicPr>
+            <a:picLocks noChangeAspect="1"/>
+          </p:cNvPicPr>
+          <p:nvPr/>
+        </p:nvPicPr>
+        <p:blipFill>
+          <a:blip r:embed="rId3"/>
+          <a:stretch>
+            <a:fillRect/>
+          </a:stretch>
+        </p:blipFill>
+        <p:spPr>
+          <a:xfrm>
+            <a:off x="968187" y="490573"/>
+            <a:ext cx="10675172" cy="2443540"/>
+          </a:xfrm>
+          <a:prstGeom prst="rect">
+            <a:avLst/>
+          </a:prstGeom>
+          <a:ln w="38100">
+            <a:solidFill>
+              <a:schemeClr val="accent1">
+                <a:lumMod val="60000"/>
+                <a:lumOff val="40000"/>
+              </a:schemeClr>
+            </a:solidFill>
+          </a:ln>
+        </p:spPr>
+      </p:pic>
+      <p:pic>
+        <p:nvPicPr>
+          <p:cNvPr id="5" name="Picture 4">
+            <a:extLst>
+              <a:ext uri="{FF2B5EF4-FFF2-40B4-BE49-F238E27FC236}">
+                <a16:creationId xmlns:a16="http://schemas.microsoft.com/office/drawing/2014/main" id="{97FC43EE-8F62-4962-BAFB-4BCE42B46E8E}"/>
+              </a:ext>
+            </a:extLst>
+          </p:cNvPr>
+          <p:cNvPicPr>
+            <a:picLocks noChangeAspect="1"/>
+          </p:cNvPicPr>
+          <p:nvPr/>
+        </p:nvPicPr>
+        <p:blipFill>
+          <a:blip r:embed="rId4"/>
+          <a:stretch>
+            <a:fillRect/>
+          </a:stretch>
+        </p:blipFill>
+        <p:spPr>
+          <a:xfrm>
+            <a:off x="922349" y="3806891"/>
+            <a:ext cx="10766849" cy="2337175"/>
+          </a:xfrm>
+          <a:prstGeom prst="rect">
+            <a:avLst/>
+          </a:prstGeom>
+          <a:ln w="38100">
+            <a:solidFill>
+              <a:schemeClr val="accent1">
+                <a:lumMod val="60000"/>
+                <a:lumOff val="40000"/>
+              </a:schemeClr>
+            </a:solidFill>
+          </a:ln>
+        </p:spPr>
+      </p:pic>
+    </p:spTree>
+    <p:extLst>
+      <p:ext uri="{BB962C8B-B14F-4D97-AF65-F5344CB8AC3E}">
+        <p14:creationId xmlns:p14="http://schemas.microsoft.com/office/powerpoint/2010/main" val="2728739638"/>
+      </p:ext>
+    </p:extLst>
+  </p:cSld>
+  <p:clrMapOvr>
+    <a:masterClrMapping/>
+  </p:clrMapOvr>
+</p:sld>
+</file>
+
+<file path=ppt/slides/slide15.xml><?xml version="1.0" encoding="utf-8"?>
+<p:sld xmlns:a="http://schemas.openxmlformats.org/drawingml/2006/main" xmlns:r="http://schemas.openxmlformats.org/officeDocument/2006/relationships" xmlns:p="http://schemas.openxmlformats.org/presentationml/2006/main">
+  <p:cSld>
+    <p:spTree>
+      <p:nvGrpSpPr>
+        <p:cNvPr id="1" name=""/>
+        <p:cNvGrpSpPr/>
+        <p:nvPr/>
+      </p:nvGrpSpPr>
+      <p:grpSpPr>
+        <a:xfrm>
+          <a:off x="0" y="0"/>
+          <a:ext cx="0" cy="0"/>
+          <a:chOff x="0" y="0"/>
+          <a:chExt cx="0" cy="0"/>
+        </a:xfrm>
+      </p:grpSpPr>
       <p:sp>
         <p:nvSpPr>
           <p:cNvPr id="3" name="Title 2">
@@ -7933,6 +8829,125 @@
     <p:extLst>
       <p:ext uri="{BB962C8B-B14F-4D97-AF65-F5344CB8AC3E}">
         <p14:creationId xmlns:p14="http://schemas.microsoft.com/office/powerpoint/2010/main" val="3658198862"/>
+      </p:ext>
+    </p:extLst>
+  </p:cSld>
+  <p:clrMapOvr>
+    <a:masterClrMapping/>
+  </p:clrMapOvr>
+</p:sld>
+</file>
+
+<file path=ppt/slides/slide16.xml><?xml version="1.0" encoding="utf-8"?>
+<p:sld xmlns:a="http://schemas.openxmlformats.org/drawingml/2006/main" xmlns:r="http://schemas.openxmlformats.org/officeDocument/2006/relationships" xmlns:p="http://schemas.openxmlformats.org/presentationml/2006/main">
+  <p:cSld>
+    <p:spTree>
+      <p:nvGrpSpPr>
+        <p:cNvPr id="1" name=""/>
+        <p:cNvGrpSpPr/>
+        <p:nvPr/>
+      </p:nvGrpSpPr>
+      <p:grpSpPr>
+        <a:xfrm>
+          <a:off x="0" y="0"/>
+          <a:ext cx="0" cy="0"/>
+          <a:chOff x="0" y="0"/>
+          <a:chExt cx="0" cy="0"/>
+        </a:xfrm>
+      </p:grpSpPr>
+      <p:sp>
+        <p:nvSpPr>
+          <p:cNvPr id="3" name="Title 2">
+            <a:extLst>
+              <a:ext uri="{FF2B5EF4-FFF2-40B4-BE49-F238E27FC236}">
+                <a16:creationId xmlns:a16="http://schemas.microsoft.com/office/drawing/2014/main" id="{AA2CEDB3-B4F2-4F10-8354-0A6B9F50029E}"/>
+              </a:ext>
+            </a:extLst>
+          </p:cNvPr>
+          <p:cNvSpPr>
+            <a:spLocks noGrp="1"/>
+          </p:cNvSpPr>
+          <p:nvPr>
+            <p:ph type="title"/>
+          </p:nvPr>
+        </p:nvSpPr>
+        <p:spPr/>
+        <p:txBody>
+          <a:bodyPr/>
+          <a:lstStyle/>
+          <a:p>
+            <a:pPr algn="ctr"/>
+            <a:r>
+              <a:rPr lang="en-CA" dirty="0"/>
+              <a:t>Software Decision Modules</a:t>
+            </a:r>
+          </a:p>
+        </p:txBody>
+      </p:sp>
+      <p:pic>
+        <p:nvPicPr>
+          <p:cNvPr id="2" name="Picture 1">
+            <a:extLst>
+              <a:ext uri="{FF2B5EF4-FFF2-40B4-BE49-F238E27FC236}">
+                <a16:creationId xmlns:a16="http://schemas.microsoft.com/office/drawing/2014/main" id="{FD7AF8D0-60D0-4C98-9A24-35341A0F0B6E}"/>
+              </a:ext>
+            </a:extLst>
+          </p:cNvPr>
+          <p:cNvPicPr>
+            <a:picLocks noChangeAspect="1"/>
+          </p:cNvPicPr>
+          <p:nvPr/>
+        </p:nvPicPr>
+        <p:blipFill>
+          <a:blip r:embed="rId3"/>
+          <a:stretch>
+            <a:fillRect/>
+          </a:stretch>
+        </p:blipFill>
+        <p:spPr>
+          <a:xfrm>
+            <a:off x="0" y="1181359"/>
+            <a:ext cx="12192000" cy="2530909"/>
+          </a:xfrm>
+          <a:prstGeom prst="rect">
+            <a:avLst/>
+          </a:prstGeom>
+        </p:spPr>
+      </p:pic>
+      <p:pic>
+        <p:nvPicPr>
+          <p:cNvPr id="5" name="Picture 4">
+            <a:extLst>
+              <a:ext uri="{FF2B5EF4-FFF2-40B4-BE49-F238E27FC236}">
+                <a16:creationId xmlns:a16="http://schemas.microsoft.com/office/drawing/2014/main" id="{F1BBF543-17DC-4E54-BF83-E10895E273D6}"/>
+              </a:ext>
+            </a:extLst>
+          </p:cNvPr>
+          <p:cNvPicPr>
+            <a:picLocks noChangeAspect="1"/>
+          </p:cNvPicPr>
+          <p:nvPr/>
+        </p:nvPicPr>
+        <p:blipFill>
+          <a:blip r:embed="rId4"/>
+          <a:stretch>
+            <a:fillRect/>
+          </a:stretch>
+        </p:blipFill>
+        <p:spPr>
+          <a:xfrm>
+            <a:off x="0" y="3712268"/>
+            <a:ext cx="12192000" cy="2404925"/>
+          </a:xfrm>
+          <a:prstGeom prst="rect">
+            <a:avLst/>
+          </a:prstGeom>
+        </p:spPr>
+      </p:pic>
+    </p:spTree>
+    <p:extLst>
+      <p:ext uri="{BB962C8B-B14F-4D97-AF65-F5344CB8AC3E}">
+        <p14:creationId xmlns:p14="http://schemas.microsoft.com/office/powerpoint/2010/main" val="2262296557"/>
       </p:ext>
     </p:extLst>
   </p:cSld>
@@ -8239,6 +9254,192 @@
 </file>
 
 <file path=ppt/slides/slide3.xml><?xml version="1.0" encoding="utf-8"?>
+<p:sld xmlns:a="http://schemas.openxmlformats.org/drawingml/2006/main" xmlns:r="http://schemas.openxmlformats.org/officeDocument/2006/relationships" xmlns:p="http://schemas.openxmlformats.org/presentationml/2006/main">
+  <p:cSld>
+    <p:spTree>
+      <p:nvGrpSpPr>
+        <p:cNvPr id="1" name=""/>
+        <p:cNvGrpSpPr/>
+        <p:nvPr/>
+      </p:nvGrpSpPr>
+      <p:grpSpPr>
+        <a:xfrm>
+          <a:off x="0" y="0"/>
+          <a:ext cx="0" cy="0"/>
+          <a:chOff x="0" y="0"/>
+          <a:chExt cx="0" cy="0"/>
+        </a:xfrm>
+      </p:grpSpPr>
+      <p:pic>
+        <p:nvPicPr>
+          <p:cNvPr id="4" name="Picture 3" descr="A screenshot of a cell phone&#10;&#10;Description automatically generated">
+            <a:extLst>
+              <a:ext uri="{FF2B5EF4-FFF2-40B4-BE49-F238E27FC236}">
+                <a16:creationId xmlns:a16="http://schemas.microsoft.com/office/drawing/2014/main" id="{0746AE0E-ECB1-4FE3-98F6-7A0FB8A60304}"/>
+              </a:ext>
+            </a:extLst>
+          </p:cNvPr>
+          <p:cNvPicPr>
+            <a:picLocks noChangeAspect="1"/>
+          </p:cNvPicPr>
+          <p:nvPr/>
+        </p:nvPicPr>
+        <p:blipFill>
+          <a:blip r:embed="rId3"/>
+          <a:stretch>
+            <a:fillRect/>
+          </a:stretch>
+        </p:blipFill>
+        <p:spPr>
+          <a:xfrm>
+            <a:off x="891770" y="424069"/>
+            <a:ext cx="9364933" cy="6009862"/>
+          </a:xfrm>
+          <a:prstGeom prst="rect">
+            <a:avLst/>
+          </a:prstGeom>
+        </p:spPr>
+      </p:pic>
+      <p:sp>
+        <p:nvSpPr>
+          <p:cNvPr id="5" name="Oval 4">
+            <a:extLst>
+              <a:ext uri="{FF2B5EF4-FFF2-40B4-BE49-F238E27FC236}">
+                <a16:creationId xmlns:a16="http://schemas.microsoft.com/office/drawing/2014/main" id="{2E25B590-B8B6-4492-A45A-C8B37BBA805C}"/>
+              </a:ext>
+            </a:extLst>
+          </p:cNvPr>
+          <p:cNvSpPr/>
+          <p:nvPr/>
+        </p:nvSpPr>
+        <p:spPr>
+          <a:xfrm>
+            <a:off x="4803354" y="132202"/>
+            <a:ext cx="6411817" cy="6648601"/>
+          </a:xfrm>
+          <a:prstGeom prst="ellipse">
+            <a:avLst/>
+          </a:prstGeom>
+          <a:noFill/>
+          <a:ln w="76200"/>
+        </p:spPr>
+        <p:style>
+          <a:lnRef idx="2">
+            <a:schemeClr val="accent1">
+              <a:shade val="50000"/>
+            </a:schemeClr>
+          </a:lnRef>
+          <a:fillRef idx="1">
+            <a:schemeClr val="accent1"/>
+          </a:fillRef>
+          <a:effectRef idx="0">
+            <a:schemeClr val="accent1"/>
+          </a:effectRef>
+          <a:fontRef idx="minor">
+            <a:schemeClr val="lt1"/>
+          </a:fontRef>
+        </p:style>
+        <p:txBody>
+          <a:bodyPr rtlCol="0" anchor="ctr"/>
+          <a:lstStyle/>
+          <a:p>
+            <a:pPr algn="ctr"/>
+            <a:endParaRPr lang="en-CA"/>
+          </a:p>
+        </p:txBody>
+      </p:sp>
+    </p:spTree>
+    <p:extLst>
+      <p:ext uri="{BB962C8B-B14F-4D97-AF65-F5344CB8AC3E}">
+        <p14:creationId xmlns:p14="http://schemas.microsoft.com/office/powerpoint/2010/main" val="335516821"/>
+      </p:ext>
+    </p:extLst>
+  </p:cSld>
+  <p:clrMapOvr>
+    <a:masterClrMapping/>
+  </p:clrMapOvr>
+  <p:timing>
+    <p:tnLst>
+      <p:par>
+        <p:cTn id="1" dur="indefinite" restart="never" nodeType="tmRoot">
+          <p:childTnLst>
+            <p:seq concurrent="1" nextAc="seek">
+              <p:cTn id="2" dur="indefinite" nodeType="mainSeq">
+                <p:childTnLst>
+                  <p:par>
+                    <p:cTn id="3" fill="hold">
+                      <p:stCondLst>
+                        <p:cond delay="indefinite"/>
+                      </p:stCondLst>
+                      <p:childTnLst>
+                        <p:par>
+                          <p:cTn id="4" fill="hold">
+                            <p:stCondLst>
+                              <p:cond delay="0"/>
+                            </p:stCondLst>
+                            <p:childTnLst>
+                              <p:par>
+                                <p:cTn id="5" presetID="1" presetClass="entr" presetSubtype="0" fill="hold" grpId="0" nodeType="clickEffect">
+                                  <p:stCondLst>
+                                    <p:cond delay="0"/>
+                                  </p:stCondLst>
+                                  <p:childTnLst>
+                                    <p:set>
+                                      <p:cBhvr>
+                                        <p:cTn id="6" dur="1" fill="hold">
+                                          <p:stCondLst>
+                                            <p:cond delay="0"/>
+                                          </p:stCondLst>
+                                        </p:cTn>
+                                        <p:tgtEl>
+                                          <p:spTgt spid="5"/>
+                                        </p:tgtEl>
+                                        <p:attrNameLst>
+                                          <p:attrName>style.visibility</p:attrName>
+                                        </p:attrNameLst>
+                                      </p:cBhvr>
+                                      <p:to>
+                                        <p:strVal val="visible"/>
+                                      </p:to>
+                                    </p:set>
+                                  </p:childTnLst>
+                                </p:cTn>
+                              </p:par>
+                            </p:childTnLst>
+                          </p:cTn>
+                        </p:par>
+                      </p:childTnLst>
+                    </p:cTn>
+                  </p:par>
+                </p:childTnLst>
+              </p:cTn>
+              <p:prevCondLst>
+                <p:cond evt="onPrev" delay="0">
+                  <p:tgtEl>
+                    <p:sldTgt/>
+                  </p:tgtEl>
+                </p:cond>
+              </p:prevCondLst>
+              <p:nextCondLst>
+                <p:cond evt="onNext" delay="0">
+                  <p:tgtEl>
+                    <p:sldTgt/>
+                  </p:tgtEl>
+                </p:cond>
+              </p:nextCondLst>
+            </p:seq>
+          </p:childTnLst>
+        </p:cTn>
+      </p:par>
+    </p:tnLst>
+    <p:bldLst>
+      <p:bldP spid="5" grpId="0" animBg="1"/>
+    </p:bldLst>
+  </p:timing>
+</p:sld>
+</file>
+
+<file path=ppt/slides/slide4.xml><?xml version="1.0" encoding="utf-8"?>
 <p:sld xmlns:a="http://schemas.openxmlformats.org/drawingml/2006/main" xmlns:r="http://schemas.openxmlformats.org/officeDocument/2006/relationships" xmlns:p="http://schemas.openxmlformats.org/presentationml/2006/main">
   <p:cSld>
     <p:spTree>
@@ -8694,7 +9895,7 @@
 </p:sld>
 </file>
 
-<file path=ppt/slides/slide4.xml><?xml version="1.0" encoding="utf-8"?>
+<file path=ppt/slides/slide5.xml><?xml version="1.0" encoding="utf-8"?>
 <p:sld xmlns:a="http://schemas.openxmlformats.org/drawingml/2006/main" xmlns:r="http://schemas.openxmlformats.org/officeDocument/2006/relationships" xmlns:p="http://schemas.openxmlformats.org/presentationml/2006/main">
   <p:cSld>
     <p:spTree>
@@ -8956,65 +10157,6 @@
 </p:sld>
 </file>
 
-<file path=ppt/slides/slide5.xml><?xml version="1.0" encoding="utf-8"?>
-<p:sld xmlns:a="http://schemas.openxmlformats.org/drawingml/2006/main" xmlns:r="http://schemas.openxmlformats.org/officeDocument/2006/relationships" xmlns:p="http://schemas.openxmlformats.org/presentationml/2006/main">
-  <p:cSld>
-    <p:spTree>
-      <p:nvGrpSpPr>
-        <p:cNvPr id="1" name=""/>
-        <p:cNvGrpSpPr/>
-        <p:nvPr/>
-      </p:nvGrpSpPr>
-      <p:grpSpPr>
-        <a:xfrm>
-          <a:off x="0" y="0"/>
-          <a:ext cx="0" cy="0"/>
-          <a:chOff x="0" y="0"/>
-          <a:chExt cx="0" cy="0"/>
-        </a:xfrm>
-      </p:grpSpPr>
-      <p:pic>
-        <p:nvPicPr>
-          <p:cNvPr id="3" name="Picture 2">
-            <a:extLst>
-              <a:ext uri="{FF2B5EF4-FFF2-40B4-BE49-F238E27FC236}">
-                <a16:creationId xmlns:a16="http://schemas.microsoft.com/office/drawing/2014/main" id="{6F258995-629E-4799-9ABA-F5FA15F81928}"/>
-              </a:ext>
-            </a:extLst>
-          </p:cNvPr>
-          <p:cNvPicPr>
-            <a:picLocks noChangeAspect="1"/>
-          </p:cNvPicPr>
-          <p:nvPr/>
-        </p:nvPicPr>
-        <p:blipFill rotWithShape="1">
-          <a:blip r:embed="rId3"/>
-          <a:srcRect l="-6706" r="6706"/>
-          <a:stretch/>
-        </p:blipFill>
-        <p:spPr>
-          <a:xfrm>
-            <a:off x="0" y="322643"/>
-            <a:ext cx="12192000" cy="6212713"/>
-          </a:xfrm>
-          <a:prstGeom prst="rect">
-            <a:avLst/>
-          </a:prstGeom>
-        </p:spPr>
-      </p:pic>
-    </p:spTree>
-    <p:extLst>
-      <p:ext uri="{BB962C8B-B14F-4D97-AF65-F5344CB8AC3E}">
-        <p14:creationId xmlns:p14="http://schemas.microsoft.com/office/powerpoint/2010/main" val="4080295408"/>
-      </p:ext>
-    </p:extLst>
-  </p:cSld>
-  <p:clrMapOvr>
-    <a:masterClrMapping/>
-  </p:clrMapOvr>
-</p:sld>
-</file>
-
 <file path=ppt/slides/slide6.xml><?xml version="1.0" encoding="utf-8"?>
 <p:sld xmlns:a="http://schemas.openxmlformats.org/drawingml/2006/main" xmlns:r="http://schemas.openxmlformats.org/officeDocument/2006/relationships" xmlns:p="http://schemas.openxmlformats.org/presentationml/2006/main">
   <p:cSld>
@@ -9034,6 +10176,65 @@
       </p:grpSpPr>
       <p:pic>
         <p:nvPicPr>
+          <p:cNvPr id="2" name="Picture 1">
+            <a:extLst>
+              <a:ext uri="{FF2B5EF4-FFF2-40B4-BE49-F238E27FC236}">
+                <a16:creationId xmlns:a16="http://schemas.microsoft.com/office/drawing/2014/main" id="{40B4850D-CA93-48DD-B5DF-589490FCF22C}"/>
+              </a:ext>
+            </a:extLst>
+          </p:cNvPr>
+          <p:cNvPicPr>
+            <a:picLocks noChangeAspect="1"/>
+          </p:cNvPicPr>
+          <p:nvPr/>
+        </p:nvPicPr>
+        <p:blipFill rotWithShape="1">
+          <a:blip r:embed="rId3"/>
+          <a:srcRect r="6371"/>
+          <a:stretch/>
+        </p:blipFill>
+        <p:spPr>
+          <a:xfrm>
+            <a:off x="667347" y="303293"/>
+            <a:ext cx="10165604" cy="6251414"/>
+          </a:xfrm>
+          <a:prstGeom prst="rect">
+            <a:avLst/>
+          </a:prstGeom>
+        </p:spPr>
+      </p:pic>
+    </p:spTree>
+    <p:extLst>
+      <p:ext uri="{BB962C8B-B14F-4D97-AF65-F5344CB8AC3E}">
+        <p14:creationId xmlns:p14="http://schemas.microsoft.com/office/powerpoint/2010/main" val="4080295408"/>
+      </p:ext>
+    </p:extLst>
+  </p:cSld>
+  <p:clrMapOvr>
+    <a:masterClrMapping/>
+  </p:clrMapOvr>
+</p:sld>
+</file>
+
+<file path=ppt/slides/slide7.xml><?xml version="1.0" encoding="utf-8"?>
+<p:sld xmlns:a="http://schemas.openxmlformats.org/drawingml/2006/main" xmlns:r="http://schemas.openxmlformats.org/officeDocument/2006/relationships" xmlns:p="http://schemas.openxmlformats.org/presentationml/2006/main">
+  <p:cSld>
+    <p:spTree>
+      <p:nvGrpSpPr>
+        <p:cNvPr id="1" name=""/>
+        <p:cNvGrpSpPr/>
+        <p:nvPr/>
+      </p:nvGrpSpPr>
+      <p:grpSpPr>
+        <a:xfrm>
+          <a:off x="0" y="0"/>
+          <a:ext cx="0" cy="0"/>
+          <a:chOff x="0" y="0"/>
+          <a:chExt cx="0" cy="0"/>
+        </a:xfrm>
+      </p:grpSpPr>
+      <p:pic>
+        <p:nvPicPr>
           <p:cNvPr id="64" name="Picture 63">
             <a:extLst>
               <a:ext uri="{FF2B5EF4-FFF2-40B4-BE49-F238E27FC236}">
@@ -9350,7 +10551,7 @@
         </p:blipFill>
         <p:spPr>
           <a:xfrm>
-            <a:off x="7057166" y="5986122"/>
+            <a:off x="5084257" y="6007983"/>
             <a:ext cx="1592599" cy="383289"/>
           </a:xfrm>
           <a:prstGeom prst="rect">
@@ -9437,7 +10638,7 @@
         </p:blipFill>
         <p:spPr>
           <a:xfrm>
-            <a:off x="2667896" y="6030895"/>
+            <a:off x="1149622" y="6030370"/>
             <a:ext cx="2106508" cy="338516"/>
           </a:xfrm>
           <a:prstGeom prst="rect">
@@ -9524,7 +10725,7 @@
         </p:blipFill>
         <p:spPr>
           <a:xfrm>
-            <a:off x="4958508" y="6007984"/>
+            <a:off x="3256130" y="6029845"/>
             <a:ext cx="1959425" cy="339566"/>
           </a:xfrm>
           <a:prstGeom prst="rect">
@@ -9672,8 +10873,8 @@
         </p:nvSpPr>
         <p:spPr>
           <a:xfrm>
-            <a:off x="2667896" y="5701553"/>
-            <a:ext cx="6121102" cy="955483"/>
+            <a:off x="1129553" y="5701553"/>
+            <a:ext cx="10165976" cy="955483"/>
           </a:xfrm>
           <a:prstGeom prst="rect">
             <a:avLst/>
@@ -9706,6 +10907,64 @@
           </a:p>
         </p:txBody>
       </p:sp>
+      <p:pic>
+        <p:nvPicPr>
+          <p:cNvPr id="23" name="Picture 22">
+            <a:extLst>
+              <a:ext uri="{FF2B5EF4-FFF2-40B4-BE49-F238E27FC236}">
+                <a16:creationId xmlns:a16="http://schemas.microsoft.com/office/drawing/2014/main" id="{D6AAD56A-ED8B-4CE7-B53C-BBBDAEBBD6FB}"/>
+              </a:ext>
+            </a:extLst>
+          </p:cNvPr>
+          <p:cNvPicPr>
+            <a:picLocks noChangeAspect="1"/>
+          </p:cNvPicPr>
+          <p:nvPr/>
+        </p:nvPicPr>
+        <p:blipFill rotWithShape="1">
+          <a:blip r:embed="rId5"/>
+          <a:srcRect l="34874" t="76984" r="38077" b="18059"/>
+          <a:stretch/>
+        </p:blipFill>
+        <p:spPr>
+          <a:xfrm>
+            <a:off x="6656691" y="6072024"/>
+            <a:ext cx="2279276" cy="240496"/>
+          </a:xfrm>
+          <a:prstGeom prst="rect">
+            <a:avLst/>
+          </a:prstGeom>
+        </p:spPr>
+      </p:pic>
+      <p:pic>
+        <p:nvPicPr>
+          <p:cNvPr id="24" name="Picture 23">
+            <a:extLst>
+              <a:ext uri="{FF2B5EF4-FFF2-40B4-BE49-F238E27FC236}">
+                <a16:creationId xmlns:a16="http://schemas.microsoft.com/office/drawing/2014/main" id="{8FD5A0A0-2265-4856-B76F-6DF7A0FE53BA}"/>
+              </a:ext>
+            </a:extLst>
+          </p:cNvPr>
+          <p:cNvPicPr>
+            <a:picLocks noChangeAspect="1"/>
+          </p:cNvPicPr>
+          <p:nvPr/>
+        </p:nvPicPr>
+        <p:blipFill rotWithShape="1">
+          <a:blip r:embed="rId5"/>
+          <a:srcRect l="35667" t="83538" r="39151" b="11030"/>
+          <a:stretch/>
+        </p:blipFill>
+        <p:spPr>
+          <a:xfrm>
+            <a:off x="8975875" y="6041988"/>
+            <a:ext cx="2237537" cy="277887"/>
+          </a:xfrm>
+          <a:prstGeom prst="rect">
+            <a:avLst/>
+          </a:prstGeom>
+        </p:spPr>
+      </p:pic>
     </p:spTree>
     <p:extLst>
       <p:ext uri="{BB962C8B-B14F-4D97-AF65-F5344CB8AC3E}">
@@ -9844,6 +11103,60 @@
                                   </p:childTnLst>
                                 </p:cTn>
                               </p:par>
+                              <p:par>
+                                <p:cTn id="13" presetID="1" presetClass="entr" presetSubtype="0" fill="hold" nodeType="withEffect">
+                                  <p:stCondLst>
+                                    <p:cond delay="0"/>
+                                  </p:stCondLst>
+                                  <p:childTnLst>
+                                    <p:set>
+                                      <p:cBhvr>
+                                        <p:cTn id="14" dur="1" fill="hold">
+                                          <p:stCondLst>
+                                            <p:cond delay="0"/>
+                                          </p:stCondLst>
+                                        </p:cTn>
+                                        <p:tgtEl>
+                                          <p:spTgt spid="23"/>
+                                        </p:tgtEl>
+                                        <p:attrNameLst>
+                                          <p:attrName>style.visibility</p:attrName>
+                                        </p:attrNameLst>
+                                      </p:cBhvr>
+                                      <p:to>
+                                        <p:strVal val="visible"/>
+                                      </p:to>
+                                    </p:set>
+                                  </p:childTnLst>
+                                </p:cTn>
+                              </p:par>
+                              <p:par>
+                                <p:cTn id="15" presetID="1" presetClass="entr" presetSubtype="0" fill="hold" nodeType="withEffect">
+                                  <p:stCondLst>
+                                    <p:cond delay="0"/>
+                                  </p:stCondLst>
+                                  <p:childTnLst>
+                                    <p:set>
+                                      <p:cBhvr>
+                                        <p:cTn id="16" dur="1" fill="hold">
+                                          <p:stCondLst>
+                                            <p:cond delay="0"/>
+                                          </p:stCondLst>
+                                        </p:cTn>
+                                        <p:tgtEl>
+                                          <p:spTgt spid="24"/>
+                                        </p:tgtEl>
+                                        <p:attrNameLst>
+                                          <p:attrName>style.visibility</p:attrName>
+                                        </p:attrNameLst>
+                                      </p:cBhvr>
+                                      <p:to>
+                                        <p:strVal val="visible"/>
+                                      </p:to>
+                                    </p:set>
+                                  </p:childTnLst>
+                                </p:cTn>
+                              </p:par>
                             </p:childTnLst>
                           </p:cTn>
                         </p:par>
@@ -9878,94 +11191,6 @@
 </p:sld>
 </file>
 
-<file path=ppt/slides/slide7.xml><?xml version="1.0" encoding="utf-8"?>
-<p:sld xmlns:a="http://schemas.openxmlformats.org/drawingml/2006/main" xmlns:r="http://schemas.openxmlformats.org/officeDocument/2006/relationships" xmlns:p="http://schemas.openxmlformats.org/presentationml/2006/main">
-  <p:cSld>
-    <p:spTree>
-      <p:nvGrpSpPr>
-        <p:cNvPr id="1" name=""/>
-        <p:cNvGrpSpPr/>
-        <p:nvPr/>
-      </p:nvGrpSpPr>
-      <p:grpSpPr>
-        <a:xfrm>
-          <a:off x="0" y="0"/>
-          <a:ext cx="0" cy="0"/>
-          <a:chOff x="0" y="0"/>
-          <a:chExt cx="0" cy="0"/>
-        </a:xfrm>
-      </p:grpSpPr>
-      <p:sp>
-        <p:nvSpPr>
-          <p:cNvPr id="2" name="Title 1">
-            <a:extLst>
-              <a:ext uri="{FF2B5EF4-FFF2-40B4-BE49-F238E27FC236}">
-                <a16:creationId xmlns:a16="http://schemas.microsoft.com/office/drawing/2014/main" id="{09489FED-F406-479B-A6F7-E42EF5F85BD2}"/>
-              </a:ext>
-            </a:extLst>
-          </p:cNvPr>
-          <p:cNvSpPr>
-            <a:spLocks noGrp="1"/>
-          </p:cNvSpPr>
-          <p:nvPr>
-            <p:ph type="title"/>
-          </p:nvPr>
-        </p:nvSpPr>
-        <p:spPr/>
-        <p:txBody>
-          <a:bodyPr/>
-          <a:lstStyle/>
-          <a:p>
-            <a:r>
-              <a:rPr lang="en-CA" dirty="0"/>
-              <a:t>Scene Module</a:t>
-            </a:r>
-          </a:p>
-        </p:txBody>
-      </p:sp>
-      <p:pic>
-        <p:nvPicPr>
-          <p:cNvPr id="7" name="Picture 6">
-            <a:extLst>
-              <a:ext uri="{FF2B5EF4-FFF2-40B4-BE49-F238E27FC236}">
-                <a16:creationId xmlns:a16="http://schemas.microsoft.com/office/drawing/2014/main" id="{314316B5-E060-45AC-A25F-5908D07AE831}"/>
-              </a:ext>
-            </a:extLst>
-          </p:cNvPr>
-          <p:cNvPicPr>
-            <a:picLocks noChangeAspect="1"/>
-          </p:cNvPicPr>
-          <p:nvPr/>
-        </p:nvPicPr>
-        <p:blipFill>
-          <a:blip r:embed="rId2"/>
-          <a:stretch>
-            <a:fillRect/>
-          </a:stretch>
-        </p:blipFill>
-        <p:spPr>
-          <a:xfrm>
-            <a:off x="142875" y="2052637"/>
-            <a:ext cx="11906250" cy="2752725"/>
-          </a:xfrm>
-          <a:prstGeom prst="rect">
-            <a:avLst/>
-          </a:prstGeom>
-        </p:spPr>
-      </p:pic>
-    </p:spTree>
-    <p:extLst>
-      <p:ext uri="{BB962C8B-B14F-4D97-AF65-F5344CB8AC3E}">
-        <p14:creationId xmlns:p14="http://schemas.microsoft.com/office/powerpoint/2010/main" val="2142511003"/>
-      </p:ext>
-    </p:extLst>
-  </p:cSld>
-  <p:clrMapOvr>
-    <a:masterClrMapping/>
-  </p:clrMapOvr>
-</p:sld>
-</file>
-
 <file path=ppt/slides/slide8.xml><?xml version="1.0" encoding="utf-8"?>
 <p:sld xmlns:a="http://schemas.openxmlformats.org/drawingml/2006/main" xmlns:r="http://schemas.openxmlformats.org/officeDocument/2006/relationships" xmlns:p="http://schemas.openxmlformats.org/presentationml/2006/main">
   <p:cSld>
@@ -9983,37 +11208,12 @@
           <a:chExt cx="0" cy="0"/>
         </a:xfrm>
       </p:grpSpPr>
-      <p:sp>
-        <p:nvSpPr>
-          <p:cNvPr id="3" name="Title 2">
-            <a:extLst>
-              <a:ext uri="{FF2B5EF4-FFF2-40B4-BE49-F238E27FC236}">
-                <a16:creationId xmlns:a16="http://schemas.microsoft.com/office/drawing/2014/main" id="{7EB4A206-AD78-4DB6-BD0D-BE02534597C1}"/>
-              </a:ext>
-            </a:extLst>
-          </p:cNvPr>
-          <p:cNvSpPr>
-            <a:spLocks noGrp="1"/>
-          </p:cNvSpPr>
-          <p:nvPr>
-            <p:ph type="title"/>
-          </p:nvPr>
-        </p:nvSpPr>
-        <p:spPr/>
-        <p:txBody>
-          <a:bodyPr/>
-          <a:lstStyle/>
-          <a:p>
-            <a:endParaRPr lang="en-CA"/>
-          </a:p>
-        </p:txBody>
-      </p:sp>
       <p:pic>
         <p:nvPicPr>
-          <p:cNvPr id="4" name="Picture 3">
-            <a:extLst>
-              <a:ext uri="{FF2B5EF4-FFF2-40B4-BE49-F238E27FC236}">
-                <a16:creationId xmlns:a16="http://schemas.microsoft.com/office/drawing/2014/main" id="{D72DCA18-2FA8-4FE4-98C9-F2E96DAAD1E7}"/>
+          <p:cNvPr id="5" name="Picture 4">
+            <a:extLst>
+              <a:ext uri="{FF2B5EF4-FFF2-40B4-BE49-F238E27FC236}">
+                <a16:creationId xmlns:a16="http://schemas.microsoft.com/office/drawing/2014/main" id="{0811CA4F-4E02-41B6-9DC0-C0AFF3F3A4B9}"/>
               </a:ext>
             </a:extLst>
           </p:cNvPr>
@@ -10022,26 +11222,970 @@
           </p:cNvPicPr>
           <p:nvPr/>
         </p:nvPicPr>
-        <p:blipFill>
-          <a:blip r:embed="rId2"/>
-          <a:stretch>
-            <a:fillRect/>
-          </a:stretch>
+        <p:blipFill rotWithShape="1">
+          <a:blip r:embed="rId3"/>
+          <a:srcRect l="34340" t="83354" r="38985" b="10796"/>
+          <a:stretch/>
         </p:blipFill>
         <p:spPr>
           <a:xfrm>
-            <a:off x="0" y="2278746"/>
-            <a:ext cx="12192000" cy="2687782"/>
+            <a:off x="3669664" y="4922263"/>
+            <a:ext cx="2896229" cy="365760"/>
           </a:xfrm>
           <a:prstGeom prst="rect">
             <a:avLst/>
           </a:prstGeom>
+          <a:ln w="38100">
+            <a:solidFill>
+              <a:schemeClr val="accent1">
+                <a:lumMod val="75000"/>
+              </a:schemeClr>
+            </a:solidFill>
+          </a:ln>
         </p:spPr>
       </p:pic>
+      <p:pic>
+        <p:nvPicPr>
+          <p:cNvPr id="6" name="Picture 5">
+            <a:extLst>
+              <a:ext uri="{FF2B5EF4-FFF2-40B4-BE49-F238E27FC236}">
+                <a16:creationId xmlns:a16="http://schemas.microsoft.com/office/drawing/2014/main" id="{0D1F0F5F-1FC5-47EF-A1AC-B50385470858}"/>
+              </a:ext>
+            </a:extLst>
+          </p:cNvPr>
+          <p:cNvPicPr>
+            <a:picLocks noChangeAspect="1"/>
+          </p:cNvPicPr>
+          <p:nvPr/>
+        </p:nvPicPr>
+        <p:blipFill rotWithShape="1">
+          <a:blip r:embed="rId3"/>
+          <a:srcRect l="34340" t="20174" r="47666" b="72954"/>
+          <a:stretch/>
+        </p:blipFill>
+        <p:spPr>
+          <a:xfrm>
+            <a:off x="5323263" y="413526"/>
+            <a:ext cx="1953658" cy="429658"/>
+          </a:xfrm>
+          <a:prstGeom prst="rect">
+            <a:avLst/>
+          </a:prstGeom>
+          <a:ln w="28575">
+            <a:solidFill>
+              <a:schemeClr val="accent1">
+                <a:lumMod val="75000"/>
+              </a:schemeClr>
+            </a:solidFill>
+          </a:ln>
+        </p:spPr>
+      </p:pic>
+      <p:pic>
+        <p:nvPicPr>
+          <p:cNvPr id="7" name="Picture 6">
+            <a:extLst>
+              <a:ext uri="{FF2B5EF4-FFF2-40B4-BE49-F238E27FC236}">
+                <a16:creationId xmlns:a16="http://schemas.microsoft.com/office/drawing/2014/main" id="{5C25F59B-3B3A-4095-84CC-1C71E92AC3DE}"/>
+              </a:ext>
+            </a:extLst>
+          </p:cNvPr>
+          <p:cNvPicPr>
+            <a:picLocks noChangeAspect="1"/>
+          </p:cNvPicPr>
+          <p:nvPr/>
+        </p:nvPicPr>
+        <p:blipFill rotWithShape="1">
+          <a:blip r:embed="rId3"/>
+          <a:srcRect l="35228" t="27536" r="46778" b="66958"/>
+          <a:stretch/>
+        </p:blipFill>
+        <p:spPr>
+          <a:xfrm>
+            <a:off x="2684435" y="3818217"/>
+            <a:ext cx="1953658" cy="344245"/>
+          </a:xfrm>
+          <a:prstGeom prst="rect">
+            <a:avLst/>
+          </a:prstGeom>
+          <a:ln w="38100">
+            <a:solidFill>
+              <a:schemeClr val="accent1">
+                <a:lumMod val="75000"/>
+              </a:schemeClr>
+            </a:solidFill>
+          </a:ln>
+        </p:spPr>
+      </p:pic>
+      <p:pic>
+        <p:nvPicPr>
+          <p:cNvPr id="8" name="Picture 7">
+            <a:extLst>
+              <a:ext uri="{FF2B5EF4-FFF2-40B4-BE49-F238E27FC236}">
+                <a16:creationId xmlns:a16="http://schemas.microsoft.com/office/drawing/2014/main" id="{C1A25289-B325-45BA-AEED-8BF931D880EE}"/>
+              </a:ext>
+            </a:extLst>
+          </p:cNvPr>
+          <p:cNvPicPr>
+            <a:picLocks noChangeAspect="1"/>
+          </p:cNvPicPr>
+          <p:nvPr/>
+        </p:nvPicPr>
+        <p:blipFill rotWithShape="1">
+          <a:blip r:embed="rId3"/>
+          <a:srcRect l="34637" t="34441" r="39736" b="60052"/>
+          <a:stretch/>
+        </p:blipFill>
+        <p:spPr>
+          <a:xfrm>
+            <a:off x="4908910" y="3818217"/>
+            <a:ext cx="2782365" cy="344246"/>
+          </a:xfrm>
+          <a:prstGeom prst="rect">
+            <a:avLst/>
+          </a:prstGeom>
+          <a:ln w="38100">
+            <a:solidFill>
+              <a:schemeClr val="accent1">
+                <a:lumMod val="75000"/>
+              </a:schemeClr>
+            </a:solidFill>
+          </a:ln>
+        </p:spPr>
+      </p:pic>
+      <p:pic>
+        <p:nvPicPr>
+          <p:cNvPr id="9" name="Picture 8">
+            <a:extLst>
+              <a:ext uri="{FF2B5EF4-FFF2-40B4-BE49-F238E27FC236}">
+                <a16:creationId xmlns:a16="http://schemas.microsoft.com/office/drawing/2014/main" id="{3DCAC481-59DE-450F-848B-8C1E0A5E17AD}"/>
+              </a:ext>
+            </a:extLst>
+          </p:cNvPr>
+          <p:cNvPicPr>
+            <a:picLocks noChangeAspect="1"/>
+          </p:cNvPicPr>
+          <p:nvPr/>
+        </p:nvPicPr>
+        <p:blipFill rotWithShape="1">
+          <a:blip r:embed="rId3"/>
+          <a:srcRect l="35196" t="40529" r="44492" b="53393"/>
+          <a:stretch/>
+        </p:blipFill>
+        <p:spPr>
+          <a:xfrm>
+            <a:off x="175756" y="3804492"/>
+            <a:ext cx="2205318" cy="379921"/>
+          </a:xfrm>
+          <a:prstGeom prst="rect">
+            <a:avLst/>
+          </a:prstGeom>
+          <a:ln w="38100">
+            <a:solidFill>
+              <a:schemeClr val="accent1">
+                <a:lumMod val="75000"/>
+              </a:schemeClr>
+            </a:solidFill>
+          </a:ln>
+        </p:spPr>
+      </p:pic>
+      <p:pic>
+        <p:nvPicPr>
+          <p:cNvPr id="10" name="Picture 9">
+            <a:extLst>
+              <a:ext uri="{FF2B5EF4-FFF2-40B4-BE49-F238E27FC236}">
+                <a16:creationId xmlns:a16="http://schemas.microsoft.com/office/drawing/2014/main" id="{1C0A2E21-E2BF-40D0-8C55-AA9375816F77}"/>
+              </a:ext>
+            </a:extLst>
+          </p:cNvPr>
+          <p:cNvPicPr>
+            <a:picLocks noChangeAspect="1"/>
+          </p:cNvPicPr>
+          <p:nvPr/>
+        </p:nvPicPr>
+        <p:blipFill rotWithShape="1">
+          <a:blip r:embed="rId3"/>
+          <a:srcRect l="34998" t="47534" r="46573" b="46959"/>
+          <a:stretch/>
+        </p:blipFill>
+        <p:spPr>
+          <a:xfrm>
+            <a:off x="10050859" y="2777742"/>
+            <a:ext cx="2000923" cy="344245"/>
+          </a:xfrm>
+          <a:prstGeom prst="rect">
+            <a:avLst/>
+          </a:prstGeom>
+          <a:ln w="38100">
+            <a:solidFill>
+              <a:schemeClr val="accent1">
+                <a:lumMod val="75000"/>
+              </a:schemeClr>
+            </a:solidFill>
+          </a:ln>
+        </p:spPr>
+      </p:pic>
+      <p:pic>
+        <p:nvPicPr>
+          <p:cNvPr id="11" name="Picture 10">
+            <a:extLst>
+              <a:ext uri="{FF2B5EF4-FFF2-40B4-BE49-F238E27FC236}">
+                <a16:creationId xmlns:a16="http://schemas.microsoft.com/office/drawing/2014/main" id="{625BF5CA-73AD-4033-A3A5-610A301E4114}"/>
+              </a:ext>
+            </a:extLst>
+          </p:cNvPr>
+          <p:cNvPicPr>
+            <a:picLocks noChangeAspect="1"/>
+          </p:cNvPicPr>
+          <p:nvPr/>
+        </p:nvPicPr>
+        <p:blipFill rotWithShape="1">
+          <a:blip r:embed="rId3"/>
+          <a:srcRect l="34340" t="54404" r="36640" b="39519"/>
+          <a:stretch/>
+        </p:blipFill>
+        <p:spPr>
+          <a:xfrm>
+            <a:off x="6669402" y="2777743"/>
+            <a:ext cx="3150825" cy="379921"/>
+          </a:xfrm>
+          <a:prstGeom prst="rect">
+            <a:avLst/>
+          </a:prstGeom>
+          <a:ln w="38100">
+            <a:solidFill>
+              <a:schemeClr val="accent1">
+                <a:lumMod val="75000"/>
+              </a:schemeClr>
+            </a:solidFill>
+          </a:ln>
+        </p:spPr>
+      </p:pic>
+      <p:pic>
+        <p:nvPicPr>
+          <p:cNvPr id="12" name="Picture 11">
+            <a:extLst>
+              <a:ext uri="{FF2B5EF4-FFF2-40B4-BE49-F238E27FC236}">
+                <a16:creationId xmlns:a16="http://schemas.microsoft.com/office/drawing/2014/main" id="{67B9FA7F-5631-40C4-81E7-081ABE979433}"/>
+              </a:ext>
+            </a:extLst>
+          </p:cNvPr>
+          <p:cNvPicPr>
+            <a:picLocks noChangeAspect="1"/>
+          </p:cNvPicPr>
+          <p:nvPr/>
+        </p:nvPicPr>
+        <p:blipFill rotWithShape="1">
+          <a:blip r:embed="rId3"/>
+          <a:srcRect l="34899" t="63162" r="47663" b="30760"/>
+          <a:stretch/>
+        </p:blipFill>
+        <p:spPr>
+          <a:xfrm>
+            <a:off x="936917" y="1380017"/>
+            <a:ext cx="1893347" cy="379921"/>
+          </a:xfrm>
+          <a:prstGeom prst="rect">
+            <a:avLst/>
+          </a:prstGeom>
+          <a:ln w="38100">
+            <a:solidFill>
+              <a:schemeClr val="accent1">
+                <a:lumMod val="75000"/>
+              </a:schemeClr>
+            </a:solidFill>
+          </a:ln>
+        </p:spPr>
+      </p:pic>
+      <p:pic>
+        <p:nvPicPr>
+          <p:cNvPr id="13" name="Picture 12">
+            <a:extLst>
+              <a:ext uri="{FF2B5EF4-FFF2-40B4-BE49-F238E27FC236}">
+                <a16:creationId xmlns:a16="http://schemas.microsoft.com/office/drawing/2014/main" id="{DB9A3DA8-578E-4DE7-8B7C-118A94126C14}"/>
+              </a:ext>
+            </a:extLst>
+          </p:cNvPr>
+          <p:cNvPicPr>
+            <a:picLocks noChangeAspect="1"/>
+          </p:cNvPicPr>
+          <p:nvPr/>
+        </p:nvPicPr>
+        <p:blipFill rotWithShape="1">
+          <a:blip r:embed="rId3"/>
+          <a:srcRect l="35295" t="69030" r="40232" b="23914"/>
+          <a:stretch/>
+        </p:blipFill>
+        <p:spPr>
+          <a:xfrm>
+            <a:off x="9394642" y="6127360"/>
+            <a:ext cx="2657140" cy="441064"/>
+          </a:xfrm>
+          <a:prstGeom prst="rect">
+            <a:avLst/>
+          </a:prstGeom>
+          <a:ln w="76200">
+            <a:solidFill>
+              <a:schemeClr val="accent1">
+                <a:lumMod val="75000"/>
+              </a:schemeClr>
+            </a:solidFill>
+          </a:ln>
+        </p:spPr>
+      </p:pic>
+      <p:pic>
+        <p:nvPicPr>
+          <p:cNvPr id="14" name="Picture 13">
+            <a:extLst>
+              <a:ext uri="{FF2B5EF4-FFF2-40B4-BE49-F238E27FC236}">
+                <a16:creationId xmlns:a16="http://schemas.microsoft.com/office/drawing/2014/main" id="{AEA1C228-2214-4AFA-97EB-A440403DAF6A}"/>
+              </a:ext>
+            </a:extLst>
+          </p:cNvPr>
+          <p:cNvPicPr>
+            <a:picLocks noChangeAspect="1"/>
+          </p:cNvPicPr>
+          <p:nvPr/>
+        </p:nvPicPr>
+        <p:blipFill rotWithShape="1">
+          <a:blip r:embed="rId3"/>
+          <a:srcRect l="34340" t="76774" r="38985" b="17375"/>
+          <a:stretch/>
+        </p:blipFill>
+        <p:spPr>
+          <a:xfrm>
+            <a:off x="419150" y="4922262"/>
+            <a:ext cx="2896228" cy="365760"/>
+          </a:xfrm>
+          <a:prstGeom prst="rect">
+            <a:avLst/>
+          </a:prstGeom>
+          <a:ln w="38100">
+            <a:solidFill>
+              <a:schemeClr val="accent1">
+                <a:lumMod val="75000"/>
+              </a:schemeClr>
+            </a:solidFill>
+          </a:ln>
+        </p:spPr>
+      </p:pic>
+      <p:cxnSp>
+        <p:nvCxnSpPr>
+          <p:cNvPr id="20" name="Connector: Elbow 19">
+            <a:extLst>
+              <a:ext uri="{FF2B5EF4-FFF2-40B4-BE49-F238E27FC236}">
+                <a16:creationId xmlns:a16="http://schemas.microsoft.com/office/drawing/2014/main" id="{9E4A1C39-16F7-470D-920F-D436774E7D4E}"/>
+              </a:ext>
+            </a:extLst>
+          </p:cNvPr>
+          <p:cNvCxnSpPr>
+            <a:stCxn id="6" idx="2"/>
+            <a:endCxn id="9" idx="0"/>
+          </p:cNvCxnSpPr>
+          <p:nvPr/>
+        </p:nvCxnSpPr>
+        <p:spPr>
+          <a:xfrm rot="5400000">
+            <a:off x="2308600" y="-187000"/>
+            <a:ext cx="2961308" cy="5021677"/>
+          </a:xfrm>
+          <a:prstGeom prst="bentConnector3">
+            <a:avLst>
+              <a:gd name="adj1" fmla="val 50000"/>
+            </a:avLst>
+          </a:prstGeom>
+          <a:ln>
+            <a:tailEnd type="triangle"/>
+          </a:ln>
+        </p:spPr>
+        <p:style>
+          <a:lnRef idx="1">
+            <a:schemeClr val="accent1"/>
+          </a:lnRef>
+          <a:fillRef idx="0">
+            <a:schemeClr val="accent1"/>
+          </a:fillRef>
+          <a:effectRef idx="0">
+            <a:schemeClr val="accent1"/>
+          </a:effectRef>
+          <a:fontRef idx="minor">
+            <a:schemeClr val="tx1"/>
+          </a:fontRef>
+        </p:style>
+      </p:cxnSp>
+      <p:cxnSp>
+        <p:nvCxnSpPr>
+          <p:cNvPr id="22" name="Connector: Elbow 21">
+            <a:extLst>
+              <a:ext uri="{FF2B5EF4-FFF2-40B4-BE49-F238E27FC236}">
+                <a16:creationId xmlns:a16="http://schemas.microsoft.com/office/drawing/2014/main" id="{492AD21B-C296-4FFE-9E7D-66E05D1A0EB0}"/>
+              </a:ext>
+            </a:extLst>
+          </p:cNvPr>
+          <p:cNvCxnSpPr>
+            <a:stCxn id="6" idx="2"/>
+            <a:endCxn id="8" idx="0"/>
+          </p:cNvCxnSpPr>
+          <p:nvPr/>
+        </p:nvCxnSpPr>
+        <p:spPr>
+          <a:xfrm rot="16200000" flipH="1">
+            <a:off x="4812576" y="2330699"/>
+            <a:ext cx="2975033" cy="1"/>
+          </a:xfrm>
+          <a:prstGeom prst="bentConnector3">
+            <a:avLst>
+              <a:gd name="adj1" fmla="val 50000"/>
+            </a:avLst>
+          </a:prstGeom>
+          <a:ln>
+            <a:tailEnd type="triangle"/>
+          </a:ln>
+        </p:spPr>
+        <p:style>
+          <a:lnRef idx="1">
+            <a:schemeClr val="accent1"/>
+          </a:lnRef>
+          <a:fillRef idx="0">
+            <a:schemeClr val="accent1"/>
+          </a:fillRef>
+          <a:effectRef idx="0">
+            <a:schemeClr val="accent1"/>
+          </a:effectRef>
+          <a:fontRef idx="minor">
+            <a:schemeClr val="tx1"/>
+          </a:fontRef>
+        </p:style>
+      </p:cxnSp>
+      <p:cxnSp>
+        <p:nvCxnSpPr>
+          <p:cNvPr id="28" name="Connector: Elbow 27">
+            <a:extLst>
+              <a:ext uri="{FF2B5EF4-FFF2-40B4-BE49-F238E27FC236}">
+                <a16:creationId xmlns:a16="http://schemas.microsoft.com/office/drawing/2014/main" id="{0E19088B-24BE-4CBF-A218-A9C740F8EA87}"/>
+              </a:ext>
+            </a:extLst>
+          </p:cNvPr>
+          <p:cNvCxnSpPr>
+            <a:stCxn id="7" idx="2"/>
+            <a:endCxn id="14" idx="0"/>
+          </p:cNvCxnSpPr>
+          <p:nvPr/>
+        </p:nvCxnSpPr>
+        <p:spPr>
+          <a:xfrm rot="5400000">
+            <a:off x="2384364" y="3645362"/>
+            <a:ext cx="759800" cy="1794000"/>
+          </a:xfrm>
+          <a:prstGeom prst="bentConnector3">
+            <a:avLst/>
+          </a:prstGeom>
+          <a:ln>
+            <a:tailEnd type="triangle"/>
+          </a:ln>
+        </p:spPr>
+        <p:style>
+          <a:lnRef idx="1">
+            <a:schemeClr val="accent1"/>
+          </a:lnRef>
+          <a:fillRef idx="0">
+            <a:schemeClr val="accent1"/>
+          </a:fillRef>
+          <a:effectRef idx="0">
+            <a:schemeClr val="accent1"/>
+          </a:effectRef>
+          <a:fontRef idx="minor">
+            <a:schemeClr val="tx1"/>
+          </a:fontRef>
+        </p:style>
+      </p:cxnSp>
+      <p:cxnSp>
+        <p:nvCxnSpPr>
+          <p:cNvPr id="30" name="Connector: Elbow 29">
+            <a:extLst>
+              <a:ext uri="{FF2B5EF4-FFF2-40B4-BE49-F238E27FC236}">
+                <a16:creationId xmlns:a16="http://schemas.microsoft.com/office/drawing/2014/main" id="{932D8CB0-F87A-48DA-8DA9-5C48A3ED30AC}"/>
+              </a:ext>
+            </a:extLst>
+          </p:cNvPr>
+          <p:cNvCxnSpPr>
+            <a:stCxn id="7" idx="2"/>
+            <a:endCxn id="5" idx="0"/>
+          </p:cNvCxnSpPr>
+          <p:nvPr/>
+        </p:nvCxnSpPr>
+        <p:spPr>
+          <a:xfrm rot="16200000" flipH="1">
+            <a:off x="4009621" y="3814104"/>
+            <a:ext cx="759801" cy="1456515"/>
+          </a:xfrm>
+          <a:prstGeom prst="bentConnector3">
+            <a:avLst/>
+          </a:prstGeom>
+          <a:ln>
+            <a:tailEnd type="triangle"/>
+          </a:ln>
+        </p:spPr>
+        <p:style>
+          <a:lnRef idx="1">
+            <a:schemeClr val="accent1"/>
+          </a:lnRef>
+          <a:fillRef idx="0">
+            <a:schemeClr val="accent1"/>
+          </a:fillRef>
+          <a:effectRef idx="0">
+            <a:schemeClr val="accent1"/>
+          </a:effectRef>
+          <a:fontRef idx="minor">
+            <a:schemeClr val="tx1"/>
+          </a:fontRef>
+        </p:style>
+      </p:cxnSp>
+      <p:pic>
+        <p:nvPicPr>
+          <p:cNvPr id="142" name="Picture 141">
+            <a:extLst>
+              <a:ext uri="{FF2B5EF4-FFF2-40B4-BE49-F238E27FC236}">
+                <a16:creationId xmlns:a16="http://schemas.microsoft.com/office/drawing/2014/main" id="{14D3B866-FB8C-4FFE-BF76-BE02069E6A3B}"/>
+              </a:ext>
+            </a:extLst>
+          </p:cNvPr>
+          <p:cNvPicPr>
+            <a:picLocks noChangeAspect="1"/>
+          </p:cNvPicPr>
+          <p:nvPr/>
+        </p:nvPicPr>
+        <p:blipFill rotWithShape="1">
+          <a:blip r:embed="rId3"/>
+          <a:srcRect l="1155" t="10954" r="68302" b="81335"/>
+          <a:stretch/>
+        </p:blipFill>
+        <p:spPr>
+          <a:xfrm>
+            <a:off x="5854552" y="6127360"/>
+            <a:ext cx="3316201" cy="482033"/>
+          </a:xfrm>
+          <a:prstGeom prst="rect">
+            <a:avLst/>
+          </a:prstGeom>
+          <a:ln w="76200">
+            <a:solidFill>
+              <a:schemeClr val="accent1">
+                <a:lumMod val="75000"/>
+              </a:schemeClr>
+            </a:solidFill>
+          </a:ln>
+        </p:spPr>
+      </p:pic>
+      <p:cxnSp>
+        <p:nvCxnSpPr>
+          <p:cNvPr id="145" name="Straight Arrow Connector 144">
+            <a:extLst>
+              <a:ext uri="{FF2B5EF4-FFF2-40B4-BE49-F238E27FC236}">
+                <a16:creationId xmlns:a16="http://schemas.microsoft.com/office/drawing/2014/main" id="{924B24DD-9D43-4A43-8D4F-0B2CFD31F5EF}"/>
+              </a:ext>
+            </a:extLst>
+          </p:cNvPr>
+          <p:cNvCxnSpPr/>
+          <p:nvPr/>
+        </p:nvCxnSpPr>
+        <p:spPr>
+          <a:xfrm>
+            <a:off x="8012921" y="5103645"/>
+            <a:ext cx="0" cy="911169"/>
+          </a:xfrm>
+          <a:prstGeom prst="straightConnector1">
+            <a:avLst/>
+          </a:prstGeom>
+          <a:ln w="38100">
+            <a:tailEnd type="triangle"/>
+          </a:ln>
+        </p:spPr>
+        <p:style>
+          <a:lnRef idx="1">
+            <a:schemeClr val="accent1"/>
+          </a:lnRef>
+          <a:fillRef idx="0">
+            <a:schemeClr val="accent1"/>
+          </a:fillRef>
+          <a:effectRef idx="0">
+            <a:schemeClr val="accent1"/>
+          </a:effectRef>
+          <a:fontRef idx="minor">
+            <a:schemeClr val="tx1"/>
+          </a:fontRef>
+        </p:style>
+      </p:cxnSp>
+      <p:cxnSp>
+        <p:nvCxnSpPr>
+          <p:cNvPr id="146" name="Straight Arrow Connector 145">
+            <a:extLst>
+              <a:ext uri="{FF2B5EF4-FFF2-40B4-BE49-F238E27FC236}">
+                <a16:creationId xmlns:a16="http://schemas.microsoft.com/office/drawing/2014/main" id="{81A3C514-E599-4393-A179-24170BAA1DCF}"/>
+              </a:ext>
+            </a:extLst>
+          </p:cNvPr>
+          <p:cNvCxnSpPr/>
+          <p:nvPr/>
+        </p:nvCxnSpPr>
+        <p:spPr>
+          <a:xfrm>
+            <a:off x="8674485" y="5103644"/>
+            <a:ext cx="0" cy="911169"/>
+          </a:xfrm>
+          <a:prstGeom prst="straightConnector1">
+            <a:avLst/>
+          </a:prstGeom>
+          <a:ln w="38100">
+            <a:tailEnd type="triangle"/>
+          </a:ln>
+        </p:spPr>
+        <p:style>
+          <a:lnRef idx="1">
+            <a:schemeClr val="accent1"/>
+          </a:lnRef>
+          <a:fillRef idx="0">
+            <a:schemeClr val="accent1"/>
+          </a:fillRef>
+          <a:effectRef idx="0">
+            <a:schemeClr val="accent1"/>
+          </a:effectRef>
+          <a:fontRef idx="minor">
+            <a:schemeClr val="tx1"/>
+          </a:fontRef>
+        </p:style>
+      </p:cxnSp>
+      <p:cxnSp>
+        <p:nvCxnSpPr>
+          <p:cNvPr id="147" name="Straight Arrow Connector 146">
+            <a:extLst>
+              <a:ext uri="{FF2B5EF4-FFF2-40B4-BE49-F238E27FC236}">
+                <a16:creationId xmlns:a16="http://schemas.microsoft.com/office/drawing/2014/main" id="{DFE0C9A4-908D-4515-A9CC-65C7AE792A64}"/>
+              </a:ext>
+            </a:extLst>
+          </p:cNvPr>
+          <p:cNvCxnSpPr/>
+          <p:nvPr/>
+        </p:nvCxnSpPr>
+        <p:spPr>
+          <a:xfrm>
+            <a:off x="7363936" y="5103643"/>
+            <a:ext cx="0" cy="911169"/>
+          </a:xfrm>
+          <a:prstGeom prst="straightConnector1">
+            <a:avLst/>
+          </a:prstGeom>
+          <a:ln w="38100">
+            <a:tailEnd type="triangle"/>
+          </a:ln>
+        </p:spPr>
+        <p:style>
+          <a:lnRef idx="1">
+            <a:schemeClr val="accent1"/>
+          </a:lnRef>
+          <a:fillRef idx="0">
+            <a:schemeClr val="accent1"/>
+          </a:fillRef>
+          <a:effectRef idx="0">
+            <a:schemeClr val="accent1"/>
+          </a:effectRef>
+          <a:fontRef idx="minor">
+            <a:schemeClr val="tx1"/>
+          </a:fontRef>
+        </p:style>
+      </p:cxnSp>
+      <p:cxnSp>
+        <p:nvCxnSpPr>
+          <p:cNvPr id="151" name="Straight Arrow Connector 150">
+            <a:extLst>
+              <a:ext uri="{FF2B5EF4-FFF2-40B4-BE49-F238E27FC236}">
+                <a16:creationId xmlns:a16="http://schemas.microsoft.com/office/drawing/2014/main" id="{6C83AFF9-A2B9-4FDD-94CA-DAC7EA0BA39C}"/>
+              </a:ext>
+            </a:extLst>
+          </p:cNvPr>
+          <p:cNvCxnSpPr/>
+          <p:nvPr/>
+        </p:nvCxnSpPr>
+        <p:spPr>
+          <a:xfrm>
+            <a:off x="10682490" y="5103647"/>
+            <a:ext cx="0" cy="911169"/>
+          </a:xfrm>
+          <a:prstGeom prst="straightConnector1">
+            <a:avLst/>
+          </a:prstGeom>
+          <a:ln w="38100">
+            <a:tailEnd type="triangle"/>
+          </a:ln>
+        </p:spPr>
+        <p:style>
+          <a:lnRef idx="1">
+            <a:schemeClr val="accent1"/>
+          </a:lnRef>
+          <a:fillRef idx="0">
+            <a:schemeClr val="accent1"/>
+          </a:fillRef>
+          <a:effectRef idx="0">
+            <a:schemeClr val="accent1"/>
+          </a:effectRef>
+          <a:fontRef idx="minor">
+            <a:schemeClr val="tx1"/>
+          </a:fontRef>
+        </p:style>
+      </p:cxnSp>
+      <p:cxnSp>
+        <p:nvCxnSpPr>
+          <p:cNvPr id="152" name="Straight Arrow Connector 151">
+            <a:extLst>
+              <a:ext uri="{FF2B5EF4-FFF2-40B4-BE49-F238E27FC236}">
+                <a16:creationId xmlns:a16="http://schemas.microsoft.com/office/drawing/2014/main" id="{663451DE-A7AF-4A16-BFD5-D4330C4BAB2A}"/>
+              </a:ext>
+            </a:extLst>
+          </p:cNvPr>
+          <p:cNvCxnSpPr/>
+          <p:nvPr/>
+        </p:nvCxnSpPr>
+        <p:spPr>
+          <a:xfrm>
+            <a:off x="11344054" y="5103646"/>
+            <a:ext cx="0" cy="911169"/>
+          </a:xfrm>
+          <a:prstGeom prst="straightConnector1">
+            <a:avLst/>
+          </a:prstGeom>
+          <a:ln w="38100">
+            <a:tailEnd type="triangle"/>
+          </a:ln>
+        </p:spPr>
+        <p:style>
+          <a:lnRef idx="1">
+            <a:schemeClr val="accent1"/>
+          </a:lnRef>
+          <a:fillRef idx="0">
+            <a:schemeClr val="accent1"/>
+          </a:fillRef>
+          <a:effectRef idx="0">
+            <a:schemeClr val="accent1"/>
+          </a:effectRef>
+          <a:fontRef idx="minor">
+            <a:schemeClr val="tx1"/>
+          </a:fontRef>
+        </p:style>
+      </p:cxnSp>
+      <p:cxnSp>
+        <p:nvCxnSpPr>
+          <p:cNvPr id="153" name="Straight Arrow Connector 152">
+            <a:extLst>
+              <a:ext uri="{FF2B5EF4-FFF2-40B4-BE49-F238E27FC236}">
+                <a16:creationId xmlns:a16="http://schemas.microsoft.com/office/drawing/2014/main" id="{9CB7F907-F2AE-4AB9-B1E9-AFAB242C916A}"/>
+              </a:ext>
+            </a:extLst>
+          </p:cNvPr>
+          <p:cNvCxnSpPr/>
+          <p:nvPr/>
+        </p:nvCxnSpPr>
+        <p:spPr>
+          <a:xfrm>
+            <a:off x="10033505" y="5103645"/>
+            <a:ext cx="0" cy="911169"/>
+          </a:xfrm>
+          <a:prstGeom prst="straightConnector1">
+            <a:avLst/>
+          </a:prstGeom>
+          <a:ln w="38100">
+            <a:tailEnd type="triangle"/>
+          </a:ln>
+        </p:spPr>
+        <p:style>
+          <a:lnRef idx="1">
+            <a:schemeClr val="accent1"/>
+          </a:lnRef>
+          <a:fillRef idx="0">
+            <a:schemeClr val="accent1"/>
+          </a:fillRef>
+          <a:effectRef idx="0">
+            <a:schemeClr val="accent1"/>
+          </a:effectRef>
+          <a:fontRef idx="minor">
+            <a:schemeClr val="tx1"/>
+          </a:fontRef>
+        </p:style>
+      </p:cxnSp>
+      <p:cxnSp>
+        <p:nvCxnSpPr>
+          <p:cNvPr id="173" name="Connector: Elbow 172">
+            <a:extLst>
+              <a:ext uri="{FF2B5EF4-FFF2-40B4-BE49-F238E27FC236}">
+                <a16:creationId xmlns:a16="http://schemas.microsoft.com/office/drawing/2014/main" id="{84B3F3D2-E870-44F0-841E-356DDDFE7F0E}"/>
+              </a:ext>
+            </a:extLst>
+          </p:cNvPr>
+          <p:cNvCxnSpPr>
+            <a:stCxn id="6" idx="2"/>
+            <a:endCxn id="7" idx="0"/>
+          </p:cNvCxnSpPr>
+          <p:nvPr/>
+        </p:nvCxnSpPr>
+        <p:spPr>
+          <a:xfrm rot="5400000">
+            <a:off x="3493162" y="1011286"/>
+            <a:ext cx="2975033" cy="2638828"/>
+          </a:xfrm>
+          <a:prstGeom prst="bentConnector3">
+            <a:avLst/>
+          </a:prstGeom>
+          <a:ln>
+            <a:tailEnd type="triangle"/>
+          </a:ln>
+        </p:spPr>
+        <p:style>
+          <a:lnRef idx="1">
+            <a:schemeClr val="accent1"/>
+          </a:lnRef>
+          <a:fillRef idx="0">
+            <a:schemeClr val="accent1"/>
+          </a:fillRef>
+          <a:effectRef idx="0">
+            <a:schemeClr val="accent1"/>
+          </a:effectRef>
+          <a:fontRef idx="minor">
+            <a:schemeClr val="tx1"/>
+          </a:fontRef>
+        </p:style>
+      </p:cxnSp>
+      <p:cxnSp>
+        <p:nvCxnSpPr>
+          <p:cNvPr id="190" name="Connector: Elbow 189">
+            <a:extLst>
+              <a:ext uri="{FF2B5EF4-FFF2-40B4-BE49-F238E27FC236}">
+                <a16:creationId xmlns:a16="http://schemas.microsoft.com/office/drawing/2014/main" id="{BC5DBD19-3D6E-4ADD-8F0A-F9142F131386}"/>
+              </a:ext>
+            </a:extLst>
+          </p:cNvPr>
+          <p:cNvCxnSpPr>
+            <a:stCxn id="6" idx="2"/>
+            <a:endCxn id="11" idx="0"/>
+          </p:cNvCxnSpPr>
+          <p:nvPr/>
+        </p:nvCxnSpPr>
+        <p:spPr>
+          <a:xfrm rot="16200000" flipH="1">
+            <a:off x="6305174" y="838101"/>
+            <a:ext cx="1934559" cy="1944723"/>
+          </a:xfrm>
+          <a:prstGeom prst="bentConnector3">
+            <a:avLst>
+              <a:gd name="adj1" fmla="val 76554"/>
+            </a:avLst>
+          </a:prstGeom>
+          <a:ln>
+            <a:tailEnd type="triangle"/>
+          </a:ln>
+        </p:spPr>
+        <p:style>
+          <a:lnRef idx="1">
+            <a:schemeClr val="accent1"/>
+          </a:lnRef>
+          <a:fillRef idx="0">
+            <a:schemeClr val="accent1"/>
+          </a:fillRef>
+          <a:effectRef idx="0">
+            <a:schemeClr val="accent1"/>
+          </a:effectRef>
+          <a:fontRef idx="minor">
+            <a:schemeClr val="tx1"/>
+          </a:fontRef>
+        </p:style>
+      </p:cxnSp>
+      <p:cxnSp>
+        <p:nvCxnSpPr>
+          <p:cNvPr id="193" name="Connector: Elbow 192">
+            <a:extLst>
+              <a:ext uri="{FF2B5EF4-FFF2-40B4-BE49-F238E27FC236}">
+                <a16:creationId xmlns:a16="http://schemas.microsoft.com/office/drawing/2014/main" id="{8D68E369-2EB5-4800-8FD2-90A7A82129D7}"/>
+              </a:ext>
+            </a:extLst>
+          </p:cNvPr>
+          <p:cNvCxnSpPr>
+            <a:stCxn id="6" idx="2"/>
+            <a:endCxn id="10" idx="0"/>
+          </p:cNvCxnSpPr>
+          <p:nvPr/>
+        </p:nvCxnSpPr>
+        <p:spPr>
+          <a:xfrm rot="16200000" flipH="1">
+            <a:off x="7708427" y="-565152"/>
+            <a:ext cx="1934558" cy="4751229"/>
+          </a:xfrm>
+          <a:prstGeom prst="bentConnector3">
+            <a:avLst>
+              <a:gd name="adj1" fmla="val 76554"/>
+            </a:avLst>
+          </a:prstGeom>
+          <a:ln>
+            <a:tailEnd type="triangle"/>
+          </a:ln>
+        </p:spPr>
+        <p:style>
+          <a:lnRef idx="1">
+            <a:schemeClr val="accent1"/>
+          </a:lnRef>
+          <a:fillRef idx="0">
+            <a:schemeClr val="accent1"/>
+          </a:fillRef>
+          <a:effectRef idx="0">
+            <a:schemeClr val="accent1"/>
+          </a:effectRef>
+          <a:fontRef idx="minor">
+            <a:schemeClr val="tx1"/>
+          </a:fontRef>
+        </p:style>
+      </p:cxnSp>
+      <p:cxnSp>
+        <p:nvCxnSpPr>
+          <p:cNvPr id="198" name="Connector: Elbow 197">
+            <a:extLst>
+              <a:ext uri="{FF2B5EF4-FFF2-40B4-BE49-F238E27FC236}">
+                <a16:creationId xmlns:a16="http://schemas.microsoft.com/office/drawing/2014/main" id="{8285C67B-2154-4A12-A5DB-FF0FF3052BA9}"/>
+              </a:ext>
+            </a:extLst>
+          </p:cNvPr>
+          <p:cNvCxnSpPr>
+            <a:stCxn id="6" idx="2"/>
+            <a:endCxn id="12" idx="3"/>
+          </p:cNvCxnSpPr>
+          <p:nvPr/>
+        </p:nvCxnSpPr>
+        <p:spPr>
+          <a:xfrm rot="5400000">
+            <a:off x="4201781" y="-528333"/>
+            <a:ext cx="726794" cy="3469828"/>
+          </a:xfrm>
+          <a:prstGeom prst="bentConnector2">
+            <a:avLst/>
+          </a:prstGeom>
+          <a:ln>
+            <a:tailEnd type="triangle"/>
+          </a:ln>
+        </p:spPr>
+        <p:style>
+          <a:lnRef idx="1">
+            <a:schemeClr val="accent1"/>
+          </a:lnRef>
+          <a:fillRef idx="0">
+            <a:schemeClr val="accent1"/>
+          </a:fillRef>
+          <a:effectRef idx="0">
+            <a:schemeClr val="accent1"/>
+          </a:effectRef>
+          <a:fontRef idx="minor">
+            <a:schemeClr val="tx1"/>
+          </a:fontRef>
+        </p:style>
+      </p:cxnSp>
     </p:spTree>
     <p:extLst>
       <p:ext uri="{BB962C8B-B14F-4D97-AF65-F5344CB8AC3E}">
-        <p14:creationId xmlns:p14="http://schemas.microsoft.com/office/powerpoint/2010/main" val="3673581030"/>
+        <p14:creationId xmlns:p14="http://schemas.microsoft.com/office/powerpoint/2010/main" val="3675916087"/>
       </p:ext>
     </p:extLst>
   </p:cSld>
@@ -10068,37 +12212,12 @@
           <a:chExt cx="0" cy="0"/>
         </a:xfrm>
       </p:grpSpPr>
-      <p:sp>
-        <p:nvSpPr>
-          <p:cNvPr id="3" name="Title 2">
-            <a:extLst>
-              <a:ext uri="{FF2B5EF4-FFF2-40B4-BE49-F238E27FC236}">
-                <a16:creationId xmlns:a16="http://schemas.microsoft.com/office/drawing/2014/main" id="{AFA2FF2A-2007-4B59-83CD-73D93638F9F4}"/>
-              </a:ext>
-            </a:extLst>
-          </p:cNvPr>
-          <p:cNvSpPr>
-            <a:spLocks noGrp="1"/>
-          </p:cNvSpPr>
-          <p:nvPr>
-            <p:ph type="title"/>
-          </p:nvPr>
-        </p:nvSpPr>
-        <p:spPr/>
-        <p:txBody>
-          <a:bodyPr/>
-          <a:lstStyle/>
-          <a:p>
-            <a:endParaRPr lang="en-CA"/>
-          </a:p>
-        </p:txBody>
-      </p:sp>
       <p:pic>
         <p:nvPicPr>
           <p:cNvPr id="4" name="Picture 3">
             <a:extLst>
               <a:ext uri="{FF2B5EF4-FFF2-40B4-BE49-F238E27FC236}">
-                <a16:creationId xmlns:a16="http://schemas.microsoft.com/office/drawing/2014/main" id="{0A009E3D-3293-4E20-BF15-1B06A3C2C44D}"/>
+                <a16:creationId xmlns:a16="http://schemas.microsoft.com/office/drawing/2014/main" id="{D72DCA18-2FA8-4FE4-98C9-F2E96DAAD1E7}"/>
               </a:ext>
             </a:extLst>
           </p:cNvPr>
@@ -10108,25 +12227,224 @@
           <p:nvPr/>
         </p:nvPicPr>
         <p:blipFill>
-          <a:blip r:embed="rId2"/>
+          <a:blip r:embed="rId3"/>
           <a:stretch>
             <a:fillRect/>
           </a:stretch>
         </p:blipFill>
         <p:spPr>
           <a:xfrm>
-            <a:off x="0" y="2187872"/>
-            <a:ext cx="12192000" cy="2482256"/>
+            <a:off x="932330" y="173976"/>
+            <a:ext cx="10728960" cy="2365248"/>
           </a:xfrm>
           <a:prstGeom prst="rect">
             <a:avLst/>
           </a:prstGeom>
+          <a:ln w="57150">
+            <a:solidFill>
+              <a:schemeClr val="accent1">
+                <a:lumMod val="60000"/>
+                <a:lumOff val="40000"/>
+              </a:schemeClr>
+            </a:solidFill>
+          </a:ln>
         </p:spPr>
       </p:pic>
+      <p:pic>
+        <p:nvPicPr>
+          <p:cNvPr id="2" name="Picture 1">
+            <a:extLst>
+              <a:ext uri="{FF2B5EF4-FFF2-40B4-BE49-F238E27FC236}">
+                <a16:creationId xmlns:a16="http://schemas.microsoft.com/office/drawing/2014/main" id="{0D6AE782-0AEE-4154-9BEC-329A1AB361A9}"/>
+              </a:ext>
+            </a:extLst>
+          </p:cNvPr>
+          <p:cNvPicPr>
+            <a:picLocks noChangeAspect="1"/>
+          </p:cNvPicPr>
+          <p:nvPr/>
+        </p:nvPicPr>
+        <p:blipFill rotWithShape="1">
+          <a:blip r:embed="rId4"/>
+          <a:srcRect r="35707" b="40549"/>
+          <a:stretch/>
+        </p:blipFill>
+        <p:spPr>
+          <a:xfrm>
+            <a:off x="174263" y="2687782"/>
+            <a:ext cx="5484260" cy="4077148"/>
+          </a:xfrm>
+          <a:prstGeom prst="rect">
+            <a:avLst/>
+          </a:prstGeom>
+        </p:spPr>
+      </p:pic>
+      <p:pic>
+        <p:nvPicPr>
+          <p:cNvPr id="5" name="Picture 4">
+            <a:extLst>
+              <a:ext uri="{FF2B5EF4-FFF2-40B4-BE49-F238E27FC236}">
+                <a16:creationId xmlns:a16="http://schemas.microsoft.com/office/drawing/2014/main" id="{4544B227-A580-442F-BB63-C322A761D453}"/>
+              </a:ext>
+            </a:extLst>
+          </p:cNvPr>
+          <p:cNvPicPr>
+            <a:picLocks noChangeAspect="1"/>
+          </p:cNvPicPr>
+          <p:nvPr/>
+        </p:nvPicPr>
+        <p:blipFill rotWithShape="1">
+          <a:blip r:embed="rId4"/>
+          <a:srcRect l="-126" t="59451" r="54599" b="1357"/>
+          <a:stretch/>
+        </p:blipFill>
+        <p:spPr>
+          <a:xfrm>
+            <a:off x="5658523" y="3487437"/>
+            <a:ext cx="3883510" cy="2687783"/>
+          </a:xfrm>
+          <a:prstGeom prst="rect">
+            <a:avLst/>
+          </a:prstGeom>
+        </p:spPr>
+      </p:pic>
+      <p:pic>
+        <p:nvPicPr>
+          <p:cNvPr id="6" name="Picture 5">
+            <a:extLst>
+              <a:ext uri="{FF2B5EF4-FFF2-40B4-BE49-F238E27FC236}">
+                <a16:creationId xmlns:a16="http://schemas.microsoft.com/office/drawing/2014/main" id="{3282846E-6AFE-48A3-A0AC-1BE15BDF1CF7}"/>
+              </a:ext>
+            </a:extLst>
+          </p:cNvPr>
+          <p:cNvPicPr>
+            <a:picLocks noChangeAspect="1"/>
+          </p:cNvPicPr>
+          <p:nvPr/>
+        </p:nvPicPr>
+        <p:blipFill rotWithShape="1">
+          <a:blip r:embed="rId4"/>
+          <a:srcRect r="58555" b="88395"/>
+          <a:stretch/>
+        </p:blipFill>
+        <p:spPr>
+          <a:xfrm>
+            <a:off x="5690793" y="2687782"/>
+            <a:ext cx="3535332" cy="795906"/>
+          </a:xfrm>
+          <a:prstGeom prst="rect">
+            <a:avLst/>
+          </a:prstGeom>
+        </p:spPr>
+      </p:pic>
+      <p:pic>
+        <p:nvPicPr>
+          <p:cNvPr id="7" name="Picture 6">
+            <a:extLst>
+              <a:ext uri="{FF2B5EF4-FFF2-40B4-BE49-F238E27FC236}">
+                <a16:creationId xmlns:a16="http://schemas.microsoft.com/office/drawing/2014/main" id="{0FCEAB0E-94F0-4E33-BC5E-1C62403CCC09}"/>
+              </a:ext>
+            </a:extLst>
+          </p:cNvPr>
+          <p:cNvPicPr>
+            <a:picLocks noChangeAspect="1"/>
+          </p:cNvPicPr>
+          <p:nvPr/>
+        </p:nvPicPr>
+        <p:blipFill rotWithShape="1">
+          <a:blip r:embed="rId4"/>
+          <a:srcRect l="65013" t="57780" r="1819" b="1748"/>
+          <a:stretch/>
+        </p:blipFill>
+        <p:spPr>
+          <a:xfrm>
+            <a:off x="9348395" y="3399585"/>
+            <a:ext cx="2829261" cy="2775635"/>
+          </a:xfrm>
+          <a:prstGeom prst="rect">
+            <a:avLst/>
+          </a:prstGeom>
+        </p:spPr>
+      </p:pic>
+      <p:pic>
+        <p:nvPicPr>
+          <p:cNvPr id="8" name="Picture 7">
+            <a:extLst>
+              <a:ext uri="{FF2B5EF4-FFF2-40B4-BE49-F238E27FC236}">
+                <a16:creationId xmlns:a16="http://schemas.microsoft.com/office/drawing/2014/main" id="{701CEF23-7021-435A-A4A6-801B90FBB9AC}"/>
+              </a:ext>
+            </a:extLst>
+          </p:cNvPr>
+          <p:cNvPicPr>
+            <a:picLocks noChangeAspect="1"/>
+          </p:cNvPicPr>
+          <p:nvPr/>
+        </p:nvPicPr>
+        <p:blipFill rotWithShape="1">
+          <a:blip r:embed="rId4"/>
+          <a:srcRect l="65154" t="6612" r="5336" b="87271"/>
+          <a:stretch/>
+        </p:blipFill>
+        <p:spPr>
+          <a:xfrm>
+            <a:off x="9348395" y="3128934"/>
+            <a:ext cx="2517289" cy="419549"/>
+          </a:xfrm>
+          <a:prstGeom prst="rect">
+            <a:avLst/>
+          </a:prstGeom>
+        </p:spPr>
+      </p:pic>
+      <p:sp>
+        <p:nvSpPr>
+          <p:cNvPr id="9" name="Rectangle 8">
+            <a:extLst>
+              <a:ext uri="{FF2B5EF4-FFF2-40B4-BE49-F238E27FC236}">
+                <a16:creationId xmlns:a16="http://schemas.microsoft.com/office/drawing/2014/main" id="{713A4FF2-9408-4ABC-A7F2-8BEDC8334B7A}"/>
+              </a:ext>
+            </a:extLst>
+          </p:cNvPr>
+          <p:cNvSpPr/>
+          <p:nvPr/>
+        </p:nvSpPr>
+        <p:spPr>
+          <a:xfrm>
+            <a:off x="5568523" y="2687782"/>
+            <a:ext cx="90000" cy="4077148"/>
+          </a:xfrm>
+          <a:prstGeom prst="rect">
+            <a:avLst/>
+          </a:prstGeom>
+        </p:spPr>
+        <p:style>
+          <a:lnRef idx="2">
+            <a:schemeClr val="accent1">
+              <a:shade val="50000"/>
+            </a:schemeClr>
+          </a:lnRef>
+          <a:fillRef idx="1">
+            <a:schemeClr val="accent1"/>
+          </a:fillRef>
+          <a:effectRef idx="0">
+            <a:schemeClr val="accent1"/>
+          </a:effectRef>
+          <a:fontRef idx="minor">
+            <a:schemeClr val="lt1"/>
+          </a:fontRef>
+        </p:style>
+        <p:txBody>
+          <a:bodyPr rtlCol="0" anchor="ctr"/>
+          <a:lstStyle/>
+          <a:p>
+            <a:pPr algn="ctr"/>
+            <a:endParaRPr lang="en-CA"/>
+          </a:p>
+        </p:txBody>
+      </p:sp>
     </p:spTree>
     <p:extLst>
       <p:ext uri="{BB962C8B-B14F-4D97-AF65-F5344CB8AC3E}">
-        <p14:creationId xmlns:p14="http://schemas.microsoft.com/office/powerpoint/2010/main" val="3448348594"/>
+        <p14:creationId xmlns:p14="http://schemas.microsoft.com/office/powerpoint/2010/main" val="3673581030"/>
       </p:ext>
     </p:extLst>
   </p:cSld>
@@ -11022,11 +13340,12 @@
 </file>
 
 <file path=customXml/item1.xml><?xml version="1.0" encoding="utf-8"?>
-<p:properties xmlns:p="http://schemas.microsoft.com/office/2006/metadata/properties" xmlns:xsi="http://www.w3.org/2001/XMLSchema-instance" xmlns:pc="http://schemas.microsoft.com/office/infopath/2007/PartnerControls">
-  <documentManagement>
-    <MediaServiceKeyPoints xmlns="71af3243-3dd4-4a8d-8c0d-dd76da1f02a5" xsi:nil="true"/>
-  </documentManagement>
-</p:properties>
+<?mso-contentType ?>
+<FormTemplates xmlns="http://schemas.microsoft.com/sharepoint/v3/contenttype/forms">
+  <Display>DocumentLibraryForm</Display>
+  <Edit>DocumentLibraryForm</Edit>
+  <New>DocumentLibraryForm</New>
+</FormTemplates>
 </file>
 
 <file path=customXml/item2.xml><?xml version="1.0" encoding="utf-8"?>
@@ -11241,27 +13560,17 @@
 </file>
 
 <file path=customXml/item3.xml><?xml version="1.0" encoding="utf-8"?>
-<?mso-contentType ?>
-<FormTemplates xmlns="http://schemas.microsoft.com/sharepoint/v3/contenttype/forms">
-  <Display>DocumentLibraryForm</Display>
-  <Edit>DocumentLibraryForm</Edit>
-  <New>DocumentLibraryForm</New>
-</FormTemplates>
+<p:properties xmlns:p="http://schemas.microsoft.com/office/2006/metadata/properties" xmlns:xsi="http://www.w3.org/2001/XMLSchema-instance" xmlns:pc="http://schemas.microsoft.com/office/infopath/2007/PartnerControls">
+  <documentManagement>
+    <MediaServiceKeyPoints xmlns="71af3243-3dd4-4a8d-8c0d-dd76da1f02a5" xsi:nil="true"/>
+  </documentManagement>
+</p:properties>
 </file>
 
 <file path=customXml/itemProps1.xml><?xml version="1.0" encoding="utf-8"?>
-<ds:datastoreItem xmlns:ds="http://schemas.openxmlformats.org/officeDocument/2006/customXml" ds:itemID="{271DA07E-9A1F-402C-A357-ABD24F8C703B}">
+<ds:datastoreItem xmlns:ds="http://schemas.openxmlformats.org/officeDocument/2006/customXml" ds:itemID="{6D0B596E-8E5F-4DB7-9C0B-A416410C0FAB}">
   <ds:schemaRefs>
-    <ds:schemaRef ds:uri="http://purl.org/dc/terms/"/>
-    <ds:schemaRef ds:uri="http://schemas.microsoft.com/office/2006/metadata/properties"/>
-    <ds:schemaRef ds:uri="http://www.w3.org/XML/1998/namespace"/>
-    <ds:schemaRef ds:uri="http://schemas.microsoft.com/office/2006/documentManagement/types"/>
-    <ds:schemaRef ds:uri="http://schemas.microsoft.com/office/infopath/2007/PartnerControls"/>
-    <ds:schemaRef ds:uri="http://schemas.openxmlformats.org/package/2006/metadata/core-properties"/>
-    <ds:schemaRef ds:uri="http://purl.org/dc/elements/1.1/"/>
-    <ds:schemaRef ds:uri="16c05727-aa75-4e4a-9b5f-8a80a1165891"/>
-    <ds:schemaRef ds:uri="71af3243-3dd4-4a8d-8c0d-dd76da1f02a5"/>
-    <ds:schemaRef ds:uri="http://purl.org/dc/dcmitype/"/>
+    <ds:schemaRef ds:uri="http://schemas.microsoft.com/sharepoint/v3/contenttype/forms"/>
   </ds:schemaRefs>
 </ds:datastoreItem>
 </file>
@@ -11286,9 +13595,18 @@
 </file>
 
 <file path=customXml/itemProps3.xml><?xml version="1.0" encoding="utf-8"?>
-<ds:datastoreItem xmlns:ds="http://schemas.openxmlformats.org/officeDocument/2006/customXml" ds:itemID="{6D0B596E-8E5F-4DB7-9C0B-A416410C0FAB}">
+<ds:datastoreItem xmlns:ds="http://schemas.openxmlformats.org/officeDocument/2006/customXml" ds:itemID="{271DA07E-9A1F-402C-A357-ABD24F8C703B}">
   <ds:schemaRefs>
-    <ds:schemaRef ds:uri="http://schemas.microsoft.com/sharepoint/v3/contenttype/forms"/>
+    <ds:schemaRef ds:uri="http://schemas.microsoft.com/office/infopath/2007/PartnerControls"/>
+    <ds:schemaRef ds:uri="http://schemas.microsoft.com/office/2006/documentManagement/types"/>
+    <ds:schemaRef ds:uri="http://purl.org/dc/elements/1.1/"/>
+    <ds:schemaRef ds:uri="http://schemas.microsoft.com/office/2006/metadata/properties"/>
+    <ds:schemaRef ds:uri="http://schemas.openxmlformats.org/package/2006/metadata/core-properties"/>
+    <ds:schemaRef ds:uri="71af3243-3dd4-4a8d-8c0d-dd76da1f02a5"/>
+    <ds:schemaRef ds:uri="http://purl.org/dc/dcmitype/"/>
+    <ds:schemaRef ds:uri="http://purl.org/dc/terms/"/>
+    <ds:schemaRef ds:uri="16c05727-aa75-4e4a-9b5f-8a80a1165891"/>
+    <ds:schemaRef ds:uri="http://www.w3.org/XML/1998/namespace"/>
   </ds:schemaRefs>
 </ds:datastoreItem>
 </file>
</xml_diff>

<commit_message>
Made changes to presentation. Realised I should add 3 Anticipated Changes (about the polygon mesh, normal maps, and scene structure).
</commit_message>
<xml_diff>
--- a/Design/mg-mis-presentation-1.pptx
+++ b/Design/mg-mis-presentation-1.pptx
@@ -283,7 +283,7 @@
           <a:p>
             <a:fld id="{DA0B549D-7912-47CE-BB9D-C81C46F21077}" type="datetimeFigureOut">
               <a:rPr lang="en-US" smtClean="0"/>
-              <a:t>11/6/2019</a:t>
+              <a:t>11/7/2019</a:t>
             </a:fld>
             <a:endParaRPr lang="en-US" dirty="0"/>
           </a:p>
@@ -460,7 +460,7 @@
           <a:p>
             <a:fld id="{93D370A3-6847-4770-BAE0-862438C62089}" type="datetimeFigureOut">
               <a:rPr lang="en-US" smtClean="0"/>
-              <a:t>11/6/2019</a:t>
+              <a:t>11/7/2019</a:t>
             </a:fld>
             <a:endParaRPr lang="en-US" dirty="0"/>
           </a:p>
@@ -1298,6 +1298,18 @@
           <a:p>
             <a:r>
               <a:rPr lang="en-CA" dirty="0"/>
+              <a:t>I made some more modifications to my document last night and added modules we’ll see in the next slide which are directly related to some new anticipated changes that I forgot to add here.</a:t>
+            </a:r>
+          </a:p>
+          <a:p>
+            <a:r>
+              <a:rPr lang="en-CA" dirty="0"/>
+              <a:t>There are that the format of polygon meshes</a:t>
+            </a:r>
+          </a:p>
+          <a:p>
+            <a:r>
+              <a:rPr lang="en-CA" dirty="0"/>
               <a:t>I specifically want to discuss these with you so keep these in mind but we’ll come back to them.</a:t>
             </a:r>
           </a:p>
@@ -1587,7 +1599,31 @@
           <a:p>
             <a:r>
               <a:rPr lang="en-CA" dirty="0"/>
-              <a:t>My last is that I don’t know what to do with these three modules; they’re necessary to hold information about the Observer, Scene, and other data structures that will be used by  the modules associated to my changes.</a:t>
+              <a:t>My last is that I don’t know what to do with these two modules; they’re necessary to hold information about the Observer, Scene, and other data structures that will be used by  the modules associated to my changes. </a:t>
+            </a:r>
+          </a:p>
+          <a:p>
+            <a:endParaRPr lang="en-CA" dirty="0"/>
+          </a:p>
+          <a:p>
+            <a:r>
+              <a:rPr lang="en-CA" dirty="0"/>
+              <a:t>I suppose I could have an anticipated change associated with the scene format; because the current scene format is based around my design decisions from the CA.</a:t>
+            </a:r>
+          </a:p>
+          <a:p>
+            <a:r>
+              <a:rPr lang="en-CA" dirty="0"/>
+              <a:t>However I don’t see how the observer module is likely to change as it represents the data structure that contains observer information, but there are only 2 pieces of information (position and direction) which I can’t think about other ways this might change.</a:t>
+            </a:r>
+          </a:p>
+          <a:p>
+            <a:endParaRPr lang="en-CA" dirty="0"/>
+          </a:p>
+          <a:p>
+            <a:r>
+              <a:rPr lang="en-CA" dirty="0"/>
+              <a:t>The other two (polygon and normal maps) will be associated to likely changes, I just forgot to add them.</a:t>
             </a:r>
           </a:p>
         </p:txBody>
@@ -7608,7 +7644,7 @@
           </a:ln>
           <a:extLst>
             <a:ext uri="{C572A759-6A51-4108-AA02-DFA0A04FC94B}">
-              <ma14:wrappingTextBoxFlag xmlns:ma14="http://schemas.microsoft.com/office/mac/drawingml/2011/main" xmlns="" val="1"/>
+              <ma14:wrappingTextBoxFlag xmlns="" xmlns:ma14="http://schemas.microsoft.com/office/mac/drawingml/2011/main" val="1"/>
             </a:ext>
           </a:extLst>
         </p:spPr>
@@ -9004,57 +9040,6 @@
       </p:sp>
       <p:sp>
         <p:nvSpPr>
-          <p:cNvPr id="3" name="Arrow: Right 2">
-            <a:extLst>
-              <a:ext uri="{FF2B5EF4-FFF2-40B4-BE49-F238E27FC236}">
-                <a16:creationId xmlns:a16="http://schemas.microsoft.com/office/drawing/2014/main" id="{A71784B9-4929-4CAB-BEE3-175E33B32E86}"/>
-              </a:ext>
-            </a:extLst>
-          </p:cNvPr>
-          <p:cNvSpPr/>
-          <p:nvPr/>
-        </p:nvSpPr>
-        <p:spPr>
-          <a:xfrm>
-            <a:off x="577668" y="5650030"/>
-            <a:ext cx="10248899" cy="1150219"/>
-          </a:xfrm>
-          <a:prstGeom prst="rightArrow">
-            <a:avLst/>
-          </a:prstGeom>
-          <a:solidFill>
-            <a:schemeClr val="accent1">
-              <a:alpha val="42000"/>
-            </a:schemeClr>
-          </a:solidFill>
-        </p:spPr>
-        <p:style>
-          <a:lnRef idx="2">
-            <a:schemeClr val="accent1">
-              <a:shade val="50000"/>
-            </a:schemeClr>
-          </a:lnRef>
-          <a:fillRef idx="1">
-            <a:schemeClr val="accent1"/>
-          </a:fillRef>
-          <a:effectRef idx="0">
-            <a:schemeClr val="accent1"/>
-          </a:effectRef>
-          <a:fontRef idx="minor">
-            <a:schemeClr val="lt1"/>
-          </a:fontRef>
-        </p:style>
-        <p:txBody>
-          <a:bodyPr rtlCol="0" anchor="ctr"/>
-          <a:lstStyle/>
-          <a:p>
-            <a:pPr algn="ctr"/>
-            <a:endParaRPr lang="en-CA" dirty="0"/>
-          </a:p>
-        </p:txBody>
-      </p:sp>
-      <p:sp>
-        <p:nvSpPr>
           <p:cNvPr id="5" name="Rectangle 4">
             <a:extLst>
               <a:ext uri="{FF2B5EF4-FFF2-40B4-BE49-F238E27FC236}">
@@ -9096,146 +9081,6 @@
                 </a:effectLst>
               </a:rPr>
               <a:t>Understand how light interacts with objects with different material properties and model it for virtual environments.</a:t>
-            </a:r>
-          </a:p>
-        </p:txBody>
-      </p:sp>
-      <p:sp>
-        <p:nvSpPr>
-          <p:cNvPr id="6" name="TextBox 5">
-            <a:extLst>
-              <a:ext uri="{FF2B5EF4-FFF2-40B4-BE49-F238E27FC236}">
-                <a16:creationId xmlns:a16="http://schemas.microsoft.com/office/drawing/2014/main" id="{02699636-736D-42C9-A225-F54F7C5374A7}"/>
-              </a:ext>
-            </a:extLst>
-          </p:cNvPr>
-          <p:cNvSpPr txBox="1"/>
-          <p:nvPr/>
-        </p:nvSpPr>
-        <p:spPr>
-          <a:xfrm>
-            <a:off x="725715" y="6040473"/>
-            <a:ext cx="1959960" cy="369332"/>
-          </a:xfrm>
-          <a:prstGeom prst="rect">
-            <a:avLst/>
-          </a:prstGeom>
-          <a:noFill/>
-        </p:spPr>
-        <p:txBody>
-          <a:bodyPr wrap="none" rtlCol="0">
-            <a:spAutoFit/>
-          </a:bodyPr>
-          <a:lstStyle/>
-          <a:p>
-            <a:r>
-              <a:rPr lang="en-CA" dirty="0"/>
-              <a:t>Computer graphics</a:t>
-            </a:r>
-          </a:p>
-        </p:txBody>
-      </p:sp>
-      <p:sp>
-        <p:nvSpPr>
-          <p:cNvPr id="7" name="TextBox 6">
-            <a:extLst>
-              <a:ext uri="{FF2B5EF4-FFF2-40B4-BE49-F238E27FC236}">
-                <a16:creationId xmlns:a16="http://schemas.microsoft.com/office/drawing/2014/main" id="{1E0CCC8C-1803-4B43-B153-9761B84F8D5A}"/>
-              </a:ext>
-            </a:extLst>
-          </p:cNvPr>
-          <p:cNvSpPr txBox="1"/>
-          <p:nvPr/>
-        </p:nvSpPr>
-        <p:spPr>
-          <a:xfrm>
-            <a:off x="2833722" y="6040473"/>
-            <a:ext cx="2071336" cy="369332"/>
-          </a:xfrm>
-          <a:prstGeom prst="rect">
-            <a:avLst/>
-          </a:prstGeom>
-          <a:noFill/>
-        </p:spPr>
-        <p:txBody>
-          <a:bodyPr wrap="none" rtlCol="0">
-            <a:spAutoFit/>
-          </a:bodyPr>
-          <a:lstStyle/>
-          <a:p>
-            <a:r>
-              <a:rPr lang="en-CA" dirty="0"/>
-              <a:t>Virtual environment</a:t>
-            </a:r>
-          </a:p>
-        </p:txBody>
-      </p:sp>
-      <p:sp>
-        <p:nvSpPr>
-          <p:cNvPr id="8" name="TextBox 7">
-            <a:extLst>
-              <a:ext uri="{FF2B5EF4-FFF2-40B4-BE49-F238E27FC236}">
-                <a16:creationId xmlns:a16="http://schemas.microsoft.com/office/drawing/2014/main" id="{4630C508-DC8F-4275-804D-69084F446E78}"/>
-              </a:ext>
-            </a:extLst>
-          </p:cNvPr>
-          <p:cNvSpPr txBox="1"/>
-          <p:nvPr/>
-        </p:nvSpPr>
-        <p:spPr>
-          <a:xfrm>
-            <a:off x="4925872" y="6040473"/>
-            <a:ext cx="1998945" cy="369332"/>
-          </a:xfrm>
-          <a:prstGeom prst="rect">
-            <a:avLst/>
-          </a:prstGeom>
-          <a:noFill/>
-        </p:spPr>
-        <p:txBody>
-          <a:bodyPr wrap="none" rtlCol="0">
-            <a:spAutoFit/>
-          </a:bodyPr>
-          <a:lstStyle/>
-          <a:p>
-            <a:r>
-              <a:rPr lang="en-CA" dirty="0"/>
-              <a:t>Material Properties</a:t>
-            </a:r>
-          </a:p>
-        </p:txBody>
-      </p:sp>
-      <p:sp>
-        <p:nvSpPr>
-          <p:cNvPr id="9" name="TextBox 8">
-            <a:extLst>
-              <a:ext uri="{FF2B5EF4-FFF2-40B4-BE49-F238E27FC236}">
-                <a16:creationId xmlns:a16="http://schemas.microsoft.com/office/drawing/2014/main" id="{F443FD13-7451-44CC-B79B-9597A41B3665}"/>
-              </a:ext>
-            </a:extLst>
-          </p:cNvPr>
-          <p:cNvSpPr txBox="1"/>
-          <p:nvPr/>
-        </p:nvSpPr>
-        <p:spPr>
-          <a:xfrm>
-            <a:off x="621742" y="5609487"/>
-            <a:ext cx="1667508" cy="369332"/>
-          </a:xfrm>
-          <a:prstGeom prst="rect">
-            <a:avLst/>
-          </a:prstGeom>
-          <a:noFill/>
-        </p:spPr>
-        <p:txBody>
-          <a:bodyPr wrap="none" rtlCol="0">
-            <a:spAutoFit/>
-          </a:bodyPr>
-          <a:lstStyle/>
-          <a:p>
-            <a:r>
-              <a:rPr lang="en-CA" dirty="0"/>
-              <a:t>Words to know:</a:t>
             </a:r>
           </a:p>
         </p:txBody>
@@ -9486,267 +9331,6 @@
           </a:prstGeom>
         </p:spPr>
       </p:pic>
-      <p:sp>
-        <p:nvSpPr>
-          <p:cNvPr id="4" name="Arrow: Right 3">
-            <a:extLst>
-              <a:ext uri="{FF2B5EF4-FFF2-40B4-BE49-F238E27FC236}">
-                <a16:creationId xmlns:a16="http://schemas.microsoft.com/office/drawing/2014/main" id="{230B2901-2A00-444D-BE18-21CFE97E6B33}"/>
-              </a:ext>
-            </a:extLst>
-          </p:cNvPr>
-          <p:cNvSpPr/>
-          <p:nvPr/>
-        </p:nvSpPr>
-        <p:spPr>
-          <a:xfrm>
-            <a:off x="577668" y="5650030"/>
-            <a:ext cx="10248899" cy="1150219"/>
-          </a:xfrm>
-          <a:prstGeom prst="rightArrow">
-            <a:avLst/>
-          </a:prstGeom>
-          <a:solidFill>
-            <a:schemeClr val="accent1">
-              <a:alpha val="42000"/>
-            </a:schemeClr>
-          </a:solidFill>
-        </p:spPr>
-        <p:style>
-          <a:lnRef idx="2">
-            <a:schemeClr val="accent1">
-              <a:shade val="50000"/>
-            </a:schemeClr>
-          </a:lnRef>
-          <a:fillRef idx="1">
-            <a:schemeClr val="accent1"/>
-          </a:fillRef>
-          <a:effectRef idx="0">
-            <a:schemeClr val="accent1"/>
-          </a:effectRef>
-          <a:fontRef idx="minor">
-            <a:schemeClr val="lt1"/>
-          </a:fontRef>
-        </p:style>
-        <p:txBody>
-          <a:bodyPr rtlCol="0" anchor="ctr"/>
-          <a:lstStyle/>
-          <a:p>
-            <a:pPr algn="ctr"/>
-            <a:endParaRPr lang="en-CA" dirty="0"/>
-          </a:p>
-        </p:txBody>
-      </p:sp>
-      <p:sp>
-        <p:nvSpPr>
-          <p:cNvPr id="5" name="TextBox 4">
-            <a:extLst>
-              <a:ext uri="{FF2B5EF4-FFF2-40B4-BE49-F238E27FC236}">
-                <a16:creationId xmlns:a16="http://schemas.microsoft.com/office/drawing/2014/main" id="{1C2A2F31-0D29-48D2-B161-EB9ED7230C59}"/>
-              </a:ext>
-            </a:extLst>
-          </p:cNvPr>
-          <p:cNvSpPr txBox="1"/>
-          <p:nvPr/>
-        </p:nvSpPr>
-        <p:spPr>
-          <a:xfrm>
-            <a:off x="725715" y="6040473"/>
-            <a:ext cx="1317284" cy="369332"/>
-          </a:xfrm>
-          <a:prstGeom prst="rect">
-            <a:avLst/>
-          </a:prstGeom>
-          <a:noFill/>
-        </p:spPr>
-        <p:txBody>
-          <a:bodyPr wrap="none" rtlCol="0">
-            <a:spAutoFit/>
-          </a:bodyPr>
-          <a:lstStyle/>
-          <a:p>
-            <a:r>
-              <a:rPr lang="en-CA" dirty="0"/>
-              <a:t>Light source</a:t>
-            </a:r>
-          </a:p>
-        </p:txBody>
-      </p:sp>
-      <p:sp>
-        <p:nvSpPr>
-          <p:cNvPr id="6" name="TextBox 5">
-            <a:extLst>
-              <a:ext uri="{FF2B5EF4-FFF2-40B4-BE49-F238E27FC236}">
-                <a16:creationId xmlns:a16="http://schemas.microsoft.com/office/drawing/2014/main" id="{C2E8A7C7-FAE5-407E-99C4-51A2E609BA9A}"/>
-              </a:ext>
-            </a:extLst>
-          </p:cNvPr>
-          <p:cNvSpPr txBox="1"/>
-          <p:nvPr/>
-        </p:nvSpPr>
-        <p:spPr>
-          <a:xfrm>
-            <a:off x="2285463" y="6040473"/>
-            <a:ext cx="1042593" cy="369332"/>
-          </a:xfrm>
-          <a:prstGeom prst="rect">
-            <a:avLst/>
-          </a:prstGeom>
-          <a:noFill/>
-        </p:spPr>
-        <p:txBody>
-          <a:bodyPr wrap="none" rtlCol="0">
-            <a:spAutoFit/>
-          </a:bodyPr>
-          <a:lstStyle/>
-          <a:p>
-            <a:r>
-              <a:rPr lang="en-CA" dirty="0"/>
-              <a:t>Observer</a:t>
-            </a:r>
-          </a:p>
-        </p:txBody>
-      </p:sp>
-      <p:sp>
-        <p:nvSpPr>
-          <p:cNvPr id="7" name="TextBox 6">
-            <a:extLst>
-              <a:ext uri="{FF2B5EF4-FFF2-40B4-BE49-F238E27FC236}">
-                <a16:creationId xmlns:a16="http://schemas.microsoft.com/office/drawing/2014/main" id="{6A2AB96F-CB4C-43A3-A5EF-159DC33BAAA3}"/>
-              </a:ext>
-            </a:extLst>
-          </p:cNvPr>
-          <p:cNvSpPr txBox="1"/>
-          <p:nvPr/>
-        </p:nvSpPr>
-        <p:spPr>
-          <a:xfrm>
-            <a:off x="621742" y="5609487"/>
-            <a:ext cx="1667508" cy="369332"/>
-          </a:xfrm>
-          <a:prstGeom prst="rect">
-            <a:avLst/>
-          </a:prstGeom>
-          <a:noFill/>
-        </p:spPr>
-        <p:txBody>
-          <a:bodyPr wrap="none" rtlCol="0">
-            <a:spAutoFit/>
-          </a:bodyPr>
-          <a:lstStyle/>
-          <a:p>
-            <a:r>
-              <a:rPr lang="en-CA" dirty="0"/>
-              <a:t>Words to know:</a:t>
-            </a:r>
-          </a:p>
-        </p:txBody>
-      </p:sp>
-      <p:sp>
-        <p:nvSpPr>
-          <p:cNvPr id="9" name="TextBox 8">
-            <a:extLst>
-              <a:ext uri="{FF2B5EF4-FFF2-40B4-BE49-F238E27FC236}">
-                <a16:creationId xmlns:a16="http://schemas.microsoft.com/office/drawing/2014/main" id="{3D591214-BF65-4652-8B78-23EBF4995BBD}"/>
-              </a:ext>
-            </a:extLst>
-          </p:cNvPr>
-          <p:cNvSpPr txBox="1"/>
-          <p:nvPr/>
-        </p:nvSpPr>
-        <p:spPr>
-          <a:xfrm>
-            <a:off x="3570520" y="6040473"/>
-            <a:ext cx="860300" cy="369332"/>
-          </a:xfrm>
-          <a:prstGeom prst="rect">
-            <a:avLst/>
-          </a:prstGeom>
-          <a:noFill/>
-        </p:spPr>
-        <p:txBody>
-          <a:bodyPr wrap="none" rtlCol="0">
-            <a:spAutoFit/>
-          </a:bodyPr>
-          <a:lstStyle/>
-          <a:p>
-            <a:r>
-              <a:rPr lang="en-CA" dirty="0"/>
-              <a:t>Render</a:t>
-            </a:r>
-          </a:p>
-        </p:txBody>
-      </p:sp>
-      <p:sp>
-        <p:nvSpPr>
-          <p:cNvPr id="10" name="TextBox 9">
-            <a:extLst>
-              <a:ext uri="{FF2B5EF4-FFF2-40B4-BE49-F238E27FC236}">
-                <a16:creationId xmlns:a16="http://schemas.microsoft.com/office/drawing/2014/main" id="{A9452B21-0AAF-43FE-BA8C-6378CE42EEF7}"/>
-              </a:ext>
-            </a:extLst>
-          </p:cNvPr>
-          <p:cNvSpPr txBox="1"/>
-          <p:nvPr/>
-        </p:nvSpPr>
-        <p:spPr>
-          <a:xfrm>
-            <a:off x="4673284" y="6040473"/>
-            <a:ext cx="1627369" cy="369332"/>
-          </a:xfrm>
-          <a:prstGeom prst="rect">
-            <a:avLst/>
-          </a:prstGeom>
-          <a:noFill/>
-        </p:spPr>
-        <p:txBody>
-          <a:bodyPr wrap="none" rtlCol="0">
-            <a:spAutoFit/>
-          </a:bodyPr>
-          <a:lstStyle/>
-          <a:p>
-            <a:r>
-              <a:rPr lang="en-CA" dirty="0"/>
-              <a:t>Shaded/Shader</a:t>
-            </a:r>
-          </a:p>
-        </p:txBody>
-      </p:sp>
-      <p:sp>
-        <p:nvSpPr>
-          <p:cNvPr id="11" name="TextBox 10">
-            <a:extLst>
-              <a:ext uri="{FF2B5EF4-FFF2-40B4-BE49-F238E27FC236}">
-                <a16:creationId xmlns:a16="http://schemas.microsoft.com/office/drawing/2014/main" id="{1A99FFAE-F3FB-4DA5-8938-7EE92C5295DE}"/>
-              </a:ext>
-            </a:extLst>
-          </p:cNvPr>
-          <p:cNvSpPr txBox="1"/>
-          <p:nvPr/>
-        </p:nvSpPr>
-        <p:spPr>
-          <a:xfrm>
-            <a:off x="6543117" y="6040473"/>
-            <a:ext cx="412292" cy="369332"/>
-          </a:xfrm>
-          <a:prstGeom prst="rect">
-            <a:avLst/>
-          </a:prstGeom>
-          <a:noFill/>
-        </p:spPr>
-        <p:txBody>
-          <a:bodyPr wrap="none" rtlCol="0">
-            <a:spAutoFit/>
-          </a:bodyPr>
-          <a:lstStyle/>
-          <a:p>
-            <a:r>
-              <a:rPr lang="en-CA" dirty="0"/>
-              <a:t>Lit</a:t>
-            </a:r>
-          </a:p>
-        </p:txBody>
-      </p:sp>
       <p:sp>
         <p:nvSpPr>
           <p:cNvPr id="2" name="Rectangle 1">
@@ -10551,7 +10135,7 @@
         </p:blipFill>
         <p:spPr>
           <a:xfrm>
-            <a:off x="5084257" y="6007983"/>
+            <a:off x="3762124" y="6007983"/>
             <a:ext cx="1592599" cy="383289"/>
           </a:xfrm>
           <a:prstGeom prst="rect">
@@ -10638,7 +10222,7 @@
         </p:blipFill>
         <p:spPr>
           <a:xfrm>
-            <a:off x="1149622" y="6030370"/>
+            <a:off x="1386983" y="6059046"/>
             <a:ext cx="2106508" cy="338516"/>
           </a:xfrm>
           <a:prstGeom prst="rect">
@@ -10704,35 +10288,6 @@
           </a:prstGeom>
         </p:spPr>
       </p:pic>
-      <p:pic>
-        <p:nvPicPr>
-          <p:cNvPr id="43" name="Picture 42">
-            <a:extLst>
-              <a:ext uri="{FF2B5EF4-FFF2-40B4-BE49-F238E27FC236}">
-                <a16:creationId xmlns:a16="http://schemas.microsoft.com/office/drawing/2014/main" id="{D6BBAD45-9AF6-47F9-AC94-C507F3403E74}"/>
-              </a:ext>
-            </a:extLst>
-          </p:cNvPr>
-          <p:cNvPicPr>
-            <a:picLocks noChangeAspect="1"/>
-          </p:cNvPicPr>
-          <p:nvPr/>
-        </p:nvPicPr>
-        <p:blipFill rotWithShape="1">
-          <a:blip r:embed="rId4"/>
-          <a:srcRect l="34116" t="64584" r="43612" b="28248"/>
-          <a:stretch/>
-        </p:blipFill>
-        <p:spPr>
-          <a:xfrm>
-            <a:off x="3256130" y="6029845"/>
-            <a:ext cx="1959425" cy="339566"/>
-          </a:xfrm>
-          <a:prstGeom prst="rect">
-            <a:avLst/>
-          </a:prstGeom>
-        </p:spPr>
-      </p:pic>
       <p:cxnSp>
         <p:nvCxnSpPr>
           <p:cNvPr id="44" name="Straight Arrow Connector 43">
@@ -10873,8 +10428,8 @@
         </p:nvSpPr>
         <p:spPr>
           <a:xfrm>
-            <a:off x="1129553" y="5701553"/>
-            <a:ext cx="10165976" cy="955483"/>
+            <a:off x="1129552" y="5701553"/>
+            <a:ext cx="4589077" cy="955483"/>
           </a:xfrm>
           <a:prstGeom prst="rect">
             <a:avLst/>
@@ -10928,7 +10483,7 @@
         </p:blipFill>
         <p:spPr>
           <a:xfrm>
-            <a:off x="6656691" y="6072024"/>
+            <a:off x="6255896" y="6059046"/>
             <a:ext cx="2279276" cy="240496"/>
           </a:xfrm>
           <a:prstGeom prst="rect">
@@ -10957,7 +10512,7 @@
         </p:blipFill>
         <p:spPr>
           <a:xfrm>
-            <a:off x="8975875" y="6041988"/>
+            <a:off x="9281442" y="6029844"/>
             <a:ext cx="2237537" cy="277887"/>
           </a:xfrm>
           <a:prstGeom prst="rect">
@@ -11063,7 +10618,7 @@
                                           </p:stCondLst>
                                         </p:cTn>
                                         <p:tgtEl>
-                                          <p:spTgt spid="43"/>
+                                          <p:spTgt spid="40"/>
                                         </p:tgtEl>
                                         <p:attrNameLst>
                                           <p:attrName>style.visibility</p:attrName>
@@ -11090,7 +10645,7 @@
                                           </p:stCondLst>
                                         </p:cTn>
                                         <p:tgtEl>
-                                          <p:spTgt spid="40"/>
+                                          <p:spTgt spid="23"/>
                                         </p:tgtEl>
                                         <p:attrNameLst>
                                           <p:attrName>style.visibility</p:attrName>
@@ -11112,33 +10667,6 @@
                                     <p:set>
                                       <p:cBhvr>
                                         <p:cTn id="14" dur="1" fill="hold">
-                                          <p:stCondLst>
-                                            <p:cond delay="0"/>
-                                          </p:stCondLst>
-                                        </p:cTn>
-                                        <p:tgtEl>
-                                          <p:spTgt spid="23"/>
-                                        </p:tgtEl>
-                                        <p:attrNameLst>
-                                          <p:attrName>style.visibility</p:attrName>
-                                        </p:attrNameLst>
-                                      </p:cBhvr>
-                                      <p:to>
-                                        <p:strVal val="visible"/>
-                                      </p:to>
-                                    </p:set>
-                                  </p:childTnLst>
-                                </p:cTn>
-                              </p:par>
-                              <p:par>
-                                <p:cTn id="15" presetID="1" presetClass="entr" presetSubtype="0" fill="hold" nodeType="withEffect">
-                                  <p:stCondLst>
-                                    <p:cond delay="0"/>
-                                  </p:stCondLst>
-                                  <p:childTnLst>
-                                    <p:set>
-                                      <p:cBhvr>
-                                        <p:cTn id="16" dur="1" fill="hold">
                                           <p:stCondLst>
                                             <p:cond delay="0"/>
                                           </p:stCondLst>
@@ -13340,12 +12868,11 @@
 </file>
 
 <file path=customXml/item1.xml><?xml version="1.0" encoding="utf-8"?>
-<?mso-contentType ?>
-<FormTemplates xmlns="http://schemas.microsoft.com/sharepoint/v3/contenttype/forms">
-  <Display>DocumentLibraryForm</Display>
-  <Edit>DocumentLibraryForm</Edit>
-  <New>DocumentLibraryForm</New>
-</FormTemplates>
+<p:properties xmlns:p="http://schemas.microsoft.com/office/2006/metadata/properties" xmlns:xsi="http://www.w3.org/2001/XMLSchema-instance" xmlns:pc="http://schemas.microsoft.com/office/infopath/2007/PartnerControls">
+  <documentManagement>
+    <MediaServiceKeyPoints xmlns="71af3243-3dd4-4a8d-8c0d-dd76da1f02a5" xsi:nil="true"/>
+  </documentManagement>
+</p:properties>
 </file>
 
 <file path=customXml/item2.xml><?xml version="1.0" encoding="utf-8"?>
@@ -13560,17 +13087,27 @@
 </file>
 
 <file path=customXml/item3.xml><?xml version="1.0" encoding="utf-8"?>
-<p:properties xmlns:p="http://schemas.microsoft.com/office/2006/metadata/properties" xmlns:xsi="http://www.w3.org/2001/XMLSchema-instance" xmlns:pc="http://schemas.microsoft.com/office/infopath/2007/PartnerControls">
-  <documentManagement>
-    <MediaServiceKeyPoints xmlns="71af3243-3dd4-4a8d-8c0d-dd76da1f02a5" xsi:nil="true"/>
-  </documentManagement>
-</p:properties>
+<?mso-contentType ?>
+<FormTemplates xmlns="http://schemas.microsoft.com/sharepoint/v3/contenttype/forms">
+  <Display>DocumentLibraryForm</Display>
+  <Edit>DocumentLibraryForm</Edit>
+  <New>DocumentLibraryForm</New>
+</FormTemplates>
 </file>
 
 <file path=customXml/itemProps1.xml><?xml version="1.0" encoding="utf-8"?>
-<ds:datastoreItem xmlns:ds="http://schemas.openxmlformats.org/officeDocument/2006/customXml" ds:itemID="{6D0B596E-8E5F-4DB7-9C0B-A416410C0FAB}">
+<ds:datastoreItem xmlns:ds="http://schemas.openxmlformats.org/officeDocument/2006/customXml" ds:itemID="{271DA07E-9A1F-402C-A357-ABD24F8C703B}">
   <ds:schemaRefs>
-    <ds:schemaRef ds:uri="http://schemas.microsoft.com/sharepoint/v3/contenttype/forms"/>
+    <ds:schemaRef ds:uri="http://schemas.microsoft.com/office/infopath/2007/PartnerControls"/>
+    <ds:schemaRef ds:uri="http://schemas.microsoft.com/office/2006/documentManagement/types"/>
+    <ds:schemaRef ds:uri="http://purl.org/dc/elements/1.1/"/>
+    <ds:schemaRef ds:uri="http://schemas.microsoft.com/office/2006/metadata/properties"/>
+    <ds:schemaRef ds:uri="http://schemas.openxmlformats.org/package/2006/metadata/core-properties"/>
+    <ds:schemaRef ds:uri="71af3243-3dd4-4a8d-8c0d-dd76da1f02a5"/>
+    <ds:schemaRef ds:uri="http://purl.org/dc/dcmitype/"/>
+    <ds:schemaRef ds:uri="http://purl.org/dc/terms/"/>
+    <ds:schemaRef ds:uri="16c05727-aa75-4e4a-9b5f-8a80a1165891"/>
+    <ds:schemaRef ds:uri="http://www.w3.org/XML/1998/namespace"/>
   </ds:schemaRefs>
 </ds:datastoreItem>
 </file>
@@ -13595,18 +13132,9 @@
 </file>
 
 <file path=customXml/itemProps3.xml><?xml version="1.0" encoding="utf-8"?>
-<ds:datastoreItem xmlns:ds="http://schemas.openxmlformats.org/officeDocument/2006/customXml" ds:itemID="{271DA07E-9A1F-402C-A357-ABD24F8C703B}">
+<ds:datastoreItem xmlns:ds="http://schemas.openxmlformats.org/officeDocument/2006/customXml" ds:itemID="{6D0B596E-8E5F-4DB7-9C0B-A416410C0FAB}">
   <ds:schemaRefs>
-    <ds:schemaRef ds:uri="http://schemas.microsoft.com/office/infopath/2007/PartnerControls"/>
-    <ds:schemaRef ds:uri="http://schemas.microsoft.com/office/2006/documentManagement/types"/>
-    <ds:schemaRef ds:uri="http://purl.org/dc/elements/1.1/"/>
-    <ds:schemaRef ds:uri="http://schemas.microsoft.com/office/2006/metadata/properties"/>
-    <ds:schemaRef ds:uri="http://schemas.openxmlformats.org/package/2006/metadata/core-properties"/>
-    <ds:schemaRef ds:uri="71af3243-3dd4-4a8d-8c0d-dd76da1f02a5"/>
-    <ds:schemaRef ds:uri="http://purl.org/dc/dcmitype/"/>
-    <ds:schemaRef ds:uri="http://purl.org/dc/terms/"/>
-    <ds:schemaRef ds:uri="16c05727-aa75-4e4a-9b5f-8a80a1165891"/>
-    <ds:schemaRef ds:uri="http://www.w3.org/XML/1998/namespace"/>
+    <ds:schemaRef ds:uri="http://schemas.microsoft.com/sharepoint/v3/contenttype/forms"/>
   </ds:schemaRefs>
 </ds:datastoreItem>
 </file>
</xml_diff>